<commit_message>
Slides created and ERD updated, as well as a naming convention fix
</commit_message>
<xml_diff>
--- a/B320_Project_Presentation.pptx
+++ b/B320_Project_Presentation.pptx
@@ -6,6 +6,8 @@
   </p:sldMasterIdLst>
   <p:sldIdLst>
     <p:sldId id="256" r:id="rId5"/>
+    <p:sldId id="257" r:id="rId6"/>
+    <p:sldId id="258" r:id="rId7"/>
   </p:sldIdLst>
   <p:sldSz cx="12192000" cy="6858000"/>
   <p:notesSz cx="6858000" cy="9144000"/>
@@ -104,7 +106,2731 @@
       </a:defRPr>
     </a:lvl9pPr>
   </p:defaultTextStyle>
+  <p:extLst>
+    <p:ext uri="{EFAFB233-063F-42B5-8137-9DF3F51BA10A}">
+      <p15:sldGuideLst xmlns:p15="http://schemas.microsoft.com/office/powerpoint/2012/main"/>
+    </p:ext>
+  </p:extLst>
 </p:presentation>
+</file>
+
+<file path=ppt/diagrams/colors1.xml><?xml version="1.0" encoding="utf-8"?>
+<dgm:colorsDef xmlns:dgm="http://schemas.openxmlformats.org/drawingml/2006/diagram" xmlns:a="http://schemas.openxmlformats.org/drawingml/2006/main" uniqueId="urn:microsoft.com/office/officeart/2005/8/colors/accent1_2">
+  <dgm:title val=""/>
+  <dgm:desc val=""/>
+  <dgm:catLst>
+    <dgm:cat type="accent1" pri="11200"/>
+  </dgm:catLst>
+  <dgm:styleLbl name="node0">
+    <dgm:fillClrLst meth="repeat">
+      <a:schemeClr val="accent1"/>
+    </dgm:fillClrLst>
+    <dgm:linClrLst meth="repeat">
+      <a:schemeClr val="lt1"/>
+    </dgm:linClrLst>
+    <dgm:effectClrLst/>
+    <dgm:txLinClrLst/>
+    <dgm:txFillClrLst/>
+    <dgm:txEffectClrLst/>
+  </dgm:styleLbl>
+  <dgm:styleLbl name="alignNode1">
+    <dgm:fillClrLst meth="repeat">
+      <a:schemeClr val="accent1"/>
+    </dgm:fillClrLst>
+    <dgm:linClrLst meth="repeat">
+      <a:schemeClr val="accent1"/>
+    </dgm:linClrLst>
+    <dgm:effectClrLst/>
+    <dgm:txLinClrLst/>
+    <dgm:txFillClrLst/>
+    <dgm:txEffectClrLst/>
+  </dgm:styleLbl>
+  <dgm:styleLbl name="node1">
+    <dgm:fillClrLst meth="repeat">
+      <a:schemeClr val="accent1"/>
+    </dgm:fillClrLst>
+    <dgm:linClrLst meth="repeat">
+      <a:schemeClr val="lt1"/>
+    </dgm:linClrLst>
+    <dgm:effectClrLst/>
+    <dgm:txLinClrLst/>
+    <dgm:txFillClrLst/>
+    <dgm:txEffectClrLst/>
+  </dgm:styleLbl>
+  <dgm:styleLbl name="lnNode1">
+    <dgm:fillClrLst meth="repeat">
+      <a:schemeClr val="accent1"/>
+    </dgm:fillClrLst>
+    <dgm:linClrLst meth="repeat">
+      <a:schemeClr val="lt1"/>
+    </dgm:linClrLst>
+    <dgm:effectClrLst/>
+    <dgm:txLinClrLst/>
+    <dgm:txFillClrLst/>
+    <dgm:txEffectClrLst/>
+  </dgm:styleLbl>
+  <dgm:styleLbl name="vennNode1">
+    <dgm:fillClrLst meth="repeat">
+      <a:schemeClr val="accent1">
+        <a:alpha val="50000"/>
+      </a:schemeClr>
+    </dgm:fillClrLst>
+    <dgm:linClrLst meth="repeat">
+      <a:schemeClr val="lt1"/>
+    </dgm:linClrLst>
+    <dgm:effectClrLst/>
+    <dgm:txLinClrLst/>
+    <dgm:txFillClrLst/>
+    <dgm:txEffectClrLst/>
+  </dgm:styleLbl>
+  <dgm:styleLbl name="node2">
+    <dgm:fillClrLst meth="repeat">
+      <a:schemeClr val="accent1"/>
+    </dgm:fillClrLst>
+    <dgm:linClrLst meth="repeat">
+      <a:schemeClr val="lt1"/>
+    </dgm:linClrLst>
+    <dgm:effectClrLst/>
+    <dgm:txLinClrLst/>
+    <dgm:txFillClrLst/>
+    <dgm:txEffectClrLst/>
+  </dgm:styleLbl>
+  <dgm:styleLbl name="node3">
+    <dgm:fillClrLst meth="repeat">
+      <a:schemeClr val="accent1"/>
+    </dgm:fillClrLst>
+    <dgm:linClrLst meth="repeat">
+      <a:schemeClr val="lt1"/>
+    </dgm:linClrLst>
+    <dgm:effectClrLst/>
+    <dgm:txLinClrLst/>
+    <dgm:txFillClrLst/>
+    <dgm:txEffectClrLst/>
+  </dgm:styleLbl>
+  <dgm:styleLbl name="node4">
+    <dgm:fillClrLst meth="repeat">
+      <a:schemeClr val="accent1"/>
+    </dgm:fillClrLst>
+    <dgm:linClrLst meth="repeat">
+      <a:schemeClr val="lt1"/>
+    </dgm:linClrLst>
+    <dgm:effectClrLst/>
+    <dgm:txLinClrLst/>
+    <dgm:txFillClrLst/>
+    <dgm:txEffectClrLst/>
+  </dgm:styleLbl>
+  <dgm:styleLbl name="fgImgPlace1">
+    <dgm:fillClrLst meth="repeat">
+      <a:schemeClr val="accent1">
+        <a:tint val="50000"/>
+      </a:schemeClr>
+    </dgm:fillClrLst>
+    <dgm:linClrLst meth="repeat">
+      <a:schemeClr val="lt1"/>
+    </dgm:linClrLst>
+    <dgm:effectClrLst/>
+    <dgm:txLinClrLst/>
+    <dgm:txFillClrLst meth="repeat">
+      <a:schemeClr val="lt1"/>
+    </dgm:txFillClrLst>
+    <dgm:txEffectClrLst/>
+  </dgm:styleLbl>
+  <dgm:styleLbl name="alignImgPlace1">
+    <dgm:fillClrLst meth="repeat">
+      <a:schemeClr val="accent1">
+        <a:tint val="50000"/>
+      </a:schemeClr>
+    </dgm:fillClrLst>
+    <dgm:linClrLst meth="repeat">
+      <a:schemeClr val="lt1"/>
+    </dgm:linClrLst>
+    <dgm:effectClrLst/>
+    <dgm:txLinClrLst/>
+    <dgm:txFillClrLst meth="repeat">
+      <a:schemeClr val="lt1"/>
+    </dgm:txFillClrLst>
+    <dgm:txEffectClrLst/>
+  </dgm:styleLbl>
+  <dgm:styleLbl name="bgImgPlace1">
+    <dgm:fillClrLst meth="repeat">
+      <a:schemeClr val="accent1">
+        <a:tint val="50000"/>
+      </a:schemeClr>
+    </dgm:fillClrLst>
+    <dgm:linClrLst meth="repeat">
+      <a:schemeClr val="lt1"/>
+    </dgm:linClrLst>
+    <dgm:effectClrLst/>
+    <dgm:txLinClrLst/>
+    <dgm:txFillClrLst meth="repeat">
+      <a:schemeClr val="lt1"/>
+    </dgm:txFillClrLst>
+    <dgm:txEffectClrLst/>
+  </dgm:styleLbl>
+  <dgm:styleLbl name="sibTrans2D1">
+    <dgm:fillClrLst meth="repeat">
+      <a:schemeClr val="accent1">
+        <a:tint val="60000"/>
+      </a:schemeClr>
+    </dgm:fillClrLst>
+    <dgm:linClrLst meth="repeat">
+      <a:schemeClr val="accent1">
+        <a:tint val="60000"/>
+      </a:schemeClr>
+    </dgm:linClrLst>
+    <dgm:effectClrLst/>
+    <dgm:txLinClrLst/>
+    <dgm:txFillClrLst/>
+    <dgm:txEffectClrLst/>
+  </dgm:styleLbl>
+  <dgm:styleLbl name="fgSibTrans2D1">
+    <dgm:fillClrLst meth="repeat">
+      <a:schemeClr val="accent1">
+        <a:tint val="60000"/>
+      </a:schemeClr>
+    </dgm:fillClrLst>
+    <dgm:linClrLst meth="repeat">
+      <a:schemeClr val="accent1">
+        <a:tint val="60000"/>
+      </a:schemeClr>
+    </dgm:linClrLst>
+    <dgm:effectClrLst/>
+    <dgm:txLinClrLst/>
+    <dgm:txFillClrLst/>
+    <dgm:txEffectClrLst/>
+  </dgm:styleLbl>
+  <dgm:styleLbl name="bgSibTrans2D1">
+    <dgm:fillClrLst meth="repeat">
+      <a:schemeClr val="accent1">
+        <a:tint val="60000"/>
+      </a:schemeClr>
+    </dgm:fillClrLst>
+    <dgm:linClrLst meth="repeat">
+      <a:schemeClr val="accent1">
+        <a:tint val="60000"/>
+      </a:schemeClr>
+    </dgm:linClrLst>
+    <dgm:effectClrLst/>
+    <dgm:txLinClrLst/>
+    <dgm:txFillClrLst/>
+    <dgm:txEffectClrLst/>
+  </dgm:styleLbl>
+  <dgm:styleLbl name="sibTrans1D1">
+    <dgm:fillClrLst meth="repeat">
+      <a:schemeClr val="accent1"/>
+    </dgm:fillClrLst>
+    <dgm:linClrLst meth="repeat">
+      <a:schemeClr val="accent1"/>
+    </dgm:linClrLst>
+    <dgm:effectClrLst/>
+    <dgm:txLinClrLst/>
+    <dgm:txFillClrLst meth="repeat">
+      <a:schemeClr val="tx1"/>
+    </dgm:txFillClrLst>
+    <dgm:txEffectClrLst/>
+  </dgm:styleLbl>
+  <dgm:styleLbl name="callout">
+    <dgm:fillClrLst meth="repeat">
+      <a:schemeClr val="accent1"/>
+    </dgm:fillClrLst>
+    <dgm:linClrLst meth="repeat">
+      <a:schemeClr val="accent1">
+        <a:tint val="50000"/>
+      </a:schemeClr>
+    </dgm:linClrLst>
+    <dgm:effectClrLst/>
+    <dgm:txLinClrLst/>
+    <dgm:txFillClrLst meth="repeat">
+      <a:schemeClr val="tx1"/>
+    </dgm:txFillClrLst>
+    <dgm:txEffectClrLst/>
+  </dgm:styleLbl>
+  <dgm:styleLbl name="asst0">
+    <dgm:fillClrLst meth="repeat">
+      <a:schemeClr val="accent1"/>
+    </dgm:fillClrLst>
+    <dgm:linClrLst meth="repeat">
+      <a:schemeClr val="lt1"/>
+    </dgm:linClrLst>
+    <dgm:effectClrLst/>
+    <dgm:txLinClrLst/>
+    <dgm:txFillClrLst/>
+    <dgm:txEffectClrLst/>
+  </dgm:styleLbl>
+  <dgm:styleLbl name="asst1">
+    <dgm:fillClrLst meth="repeat">
+      <a:schemeClr val="accent1"/>
+    </dgm:fillClrLst>
+    <dgm:linClrLst meth="repeat">
+      <a:schemeClr val="lt1"/>
+    </dgm:linClrLst>
+    <dgm:effectClrLst/>
+    <dgm:txLinClrLst/>
+    <dgm:txFillClrLst/>
+    <dgm:txEffectClrLst/>
+  </dgm:styleLbl>
+  <dgm:styleLbl name="asst2">
+    <dgm:fillClrLst meth="repeat">
+      <a:schemeClr val="accent1"/>
+    </dgm:fillClrLst>
+    <dgm:linClrLst meth="repeat">
+      <a:schemeClr val="lt1"/>
+    </dgm:linClrLst>
+    <dgm:effectClrLst/>
+    <dgm:txLinClrLst/>
+    <dgm:txFillClrLst/>
+    <dgm:txEffectClrLst/>
+  </dgm:styleLbl>
+  <dgm:styleLbl name="asst3">
+    <dgm:fillClrLst meth="repeat">
+      <a:schemeClr val="accent1"/>
+    </dgm:fillClrLst>
+    <dgm:linClrLst meth="repeat">
+      <a:schemeClr val="lt1"/>
+    </dgm:linClrLst>
+    <dgm:effectClrLst/>
+    <dgm:txLinClrLst/>
+    <dgm:txFillClrLst/>
+    <dgm:txEffectClrLst/>
+  </dgm:styleLbl>
+  <dgm:styleLbl name="asst4">
+    <dgm:fillClrLst meth="repeat">
+      <a:schemeClr val="accent1"/>
+    </dgm:fillClrLst>
+    <dgm:linClrLst meth="repeat">
+      <a:schemeClr val="lt1"/>
+    </dgm:linClrLst>
+    <dgm:effectClrLst/>
+    <dgm:txLinClrLst/>
+    <dgm:txFillClrLst/>
+    <dgm:txEffectClrLst/>
+  </dgm:styleLbl>
+  <dgm:styleLbl name="parChTrans2D1">
+    <dgm:fillClrLst meth="repeat">
+      <a:schemeClr val="accent1">
+        <a:tint val="60000"/>
+      </a:schemeClr>
+    </dgm:fillClrLst>
+    <dgm:linClrLst meth="repeat">
+      <a:schemeClr val="accent1">
+        <a:tint val="60000"/>
+      </a:schemeClr>
+    </dgm:linClrLst>
+    <dgm:effectClrLst/>
+    <dgm:txLinClrLst/>
+    <dgm:txFillClrLst meth="repeat">
+      <a:schemeClr val="lt1"/>
+    </dgm:txFillClrLst>
+    <dgm:txEffectClrLst/>
+  </dgm:styleLbl>
+  <dgm:styleLbl name="parChTrans2D2">
+    <dgm:fillClrLst meth="repeat">
+      <a:schemeClr val="accent1"/>
+    </dgm:fillClrLst>
+    <dgm:linClrLst meth="repeat">
+      <a:schemeClr val="accent1"/>
+    </dgm:linClrLst>
+    <dgm:effectClrLst/>
+    <dgm:txLinClrLst/>
+    <dgm:txFillClrLst meth="repeat">
+      <a:schemeClr val="lt1"/>
+    </dgm:txFillClrLst>
+    <dgm:txEffectClrLst/>
+  </dgm:styleLbl>
+  <dgm:styleLbl name="parChTrans2D3">
+    <dgm:fillClrLst meth="repeat">
+      <a:schemeClr val="accent1"/>
+    </dgm:fillClrLst>
+    <dgm:linClrLst meth="repeat">
+      <a:schemeClr val="accent1"/>
+    </dgm:linClrLst>
+    <dgm:effectClrLst/>
+    <dgm:txLinClrLst/>
+    <dgm:txFillClrLst meth="repeat">
+      <a:schemeClr val="lt1"/>
+    </dgm:txFillClrLst>
+    <dgm:txEffectClrLst/>
+  </dgm:styleLbl>
+  <dgm:styleLbl name="parChTrans2D4">
+    <dgm:fillClrLst meth="repeat">
+      <a:schemeClr val="accent1"/>
+    </dgm:fillClrLst>
+    <dgm:linClrLst meth="repeat">
+      <a:schemeClr val="accent1"/>
+    </dgm:linClrLst>
+    <dgm:effectClrLst/>
+    <dgm:txLinClrLst/>
+    <dgm:txFillClrLst meth="repeat">
+      <a:schemeClr val="lt1"/>
+    </dgm:txFillClrLst>
+    <dgm:txEffectClrLst/>
+  </dgm:styleLbl>
+  <dgm:styleLbl name="parChTrans1D1">
+    <dgm:fillClrLst meth="repeat">
+      <a:schemeClr val="accent1"/>
+    </dgm:fillClrLst>
+    <dgm:linClrLst meth="repeat">
+      <a:schemeClr val="accent1">
+        <a:shade val="60000"/>
+      </a:schemeClr>
+    </dgm:linClrLst>
+    <dgm:effectClrLst/>
+    <dgm:txLinClrLst/>
+    <dgm:txFillClrLst meth="repeat">
+      <a:schemeClr val="tx1"/>
+    </dgm:txFillClrLst>
+    <dgm:txEffectClrLst/>
+  </dgm:styleLbl>
+  <dgm:styleLbl name="parChTrans1D2">
+    <dgm:fillClrLst meth="repeat">
+      <a:schemeClr val="accent1"/>
+    </dgm:fillClrLst>
+    <dgm:linClrLst meth="repeat">
+      <a:schemeClr val="accent1">
+        <a:shade val="60000"/>
+      </a:schemeClr>
+    </dgm:linClrLst>
+    <dgm:effectClrLst/>
+    <dgm:txLinClrLst/>
+    <dgm:txFillClrLst meth="repeat">
+      <a:schemeClr val="tx1"/>
+    </dgm:txFillClrLst>
+    <dgm:txEffectClrLst/>
+  </dgm:styleLbl>
+  <dgm:styleLbl name="parChTrans1D3">
+    <dgm:fillClrLst meth="repeat">
+      <a:schemeClr val="accent1"/>
+    </dgm:fillClrLst>
+    <dgm:linClrLst meth="repeat">
+      <a:schemeClr val="accent1">
+        <a:shade val="80000"/>
+      </a:schemeClr>
+    </dgm:linClrLst>
+    <dgm:effectClrLst/>
+    <dgm:txLinClrLst/>
+    <dgm:txFillClrLst meth="repeat">
+      <a:schemeClr val="tx1"/>
+    </dgm:txFillClrLst>
+    <dgm:txEffectClrLst/>
+  </dgm:styleLbl>
+  <dgm:styleLbl name="parChTrans1D4">
+    <dgm:fillClrLst meth="repeat">
+      <a:schemeClr val="accent1"/>
+    </dgm:fillClrLst>
+    <dgm:linClrLst meth="repeat">
+      <a:schemeClr val="accent1">
+        <a:shade val="80000"/>
+      </a:schemeClr>
+    </dgm:linClrLst>
+    <dgm:effectClrLst/>
+    <dgm:txLinClrLst/>
+    <dgm:txFillClrLst meth="repeat">
+      <a:schemeClr val="tx1"/>
+    </dgm:txFillClrLst>
+    <dgm:txEffectClrLst/>
+  </dgm:styleLbl>
+  <dgm:styleLbl name="fgAcc1">
+    <dgm:fillClrLst meth="repeat">
+      <a:schemeClr val="lt1">
+        <a:alpha val="90000"/>
+      </a:schemeClr>
+    </dgm:fillClrLst>
+    <dgm:linClrLst meth="repeat">
+      <a:schemeClr val="accent1"/>
+    </dgm:linClrLst>
+    <dgm:effectClrLst/>
+    <dgm:txLinClrLst/>
+    <dgm:txFillClrLst meth="repeat">
+      <a:schemeClr val="dk1"/>
+    </dgm:txFillClrLst>
+    <dgm:txEffectClrLst/>
+  </dgm:styleLbl>
+  <dgm:styleLbl name="conFgAcc1">
+    <dgm:fillClrLst meth="repeat">
+      <a:schemeClr val="lt1">
+        <a:alpha val="90000"/>
+      </a:schemeClr>
+    </dgm:fillClrLst>
+    <dgm:linClrLst meth="repeat">
+      <a:schemeClr val="accent1"/>
+    </dgm:linClrLst>
+    <dgm:effectClrLst/>
+    <dgm:txLinClrLst/>
+    <dgm:txFillClrLst meth="repeat">
+      <a:schemeClr val="dk1"/>
+    </dgm:txFillClrLst>
+    <dgm:txEffectClrLst/>
+  </dgm:styleLbl>
+  <dgm:styleLbl name="alignAcc1">
+    <dgm:fillClrLst meth="repeat">
+      <a:schemeClr val="lt1">
+        <a:alpha val="90000"/>
+      </a:schemeClr>
+    </dgm:fillClrLst>
+    <dgm:linClrLst meth="repeat">
+      <a:schemeClr val="accent1"/>
+    </dgm:linClrLst>
+    <dgm:effectClrLst/>
+    <dgm:txLinClrLst/>
+    <dgm:txFillClrLst meth="repeat">
+      <a:schemeClr val="dk1"/>
+    </dgm:txFillClrLst>
+    <dgm:txEffectClrLst/>
+  </dgm:styleLbl>
+  <dgm:styleLbl name="trAlignAcc1">
+    <dgm:fillClrLst meth="repeat">
+      <a:schemeClr val="lt1">
+        <a:alpha val="40000"/>
+      </a:schemeClr>
+    </dgm:fillClrLst>
+    <dgm:linClrLst meth="repeat">
+      <a:schemeClr val="accent1"/>
+    </dgm:linClrLst>
+    <dgm:effectClrLst/>
+    <dgm:txLinClrLst/>
+    <dgm:txFillClrLst meth="repeat">
+      <a:schemeClr val="dk1"/>
+    </dgm:txFillClrLst>
+    <dgm:txEffectClrLst/>
+  </dgm:styleLbl>
+  <dgm:styleLbl name="bgAcc1">
+    <dgm:fillClrLst meth="repeat">
+      <a:schemeClr val="lt1">
+        <a:alpha val="90000"/>
+      </a:schemeClr>
+    </dgm:fillClrLst>
+    <dgm:linClrLst meth="repeat">
+      <a:schemeClr val="accent1"/>
+    </dgm:linClrLst>
+    <dgm:effectClrLst/>
+    <dgm:txLinClrLst/>
+    <dgm:txFillClrLst meth="repeat">
+      <a:schemeClr val="dk1"/>
+    </dgm:txFillClrLst>
+    <dgm:txEffectClrLst/>
+  </dgm:styleLbl>
+  <dgm:styleLbl name="solidFgAcc1">
+    <dgm:fillClrLst meth="repeat">
+      <a:schemeClr val="lt1"/>
+    </dgm:fillClrLst>
+    <dgm:linClrLst meth="repeat">
+      <a:schemeClr val="accent1"/>
+    </dgm:linClrLst>
+    <dgm:effectClrLst/>
+    <dgm:txLinClrLst/>
+    <dgm:txFillClrLst meth="repeat">
+      <a:schemeClr val="dk1"/>
+    </dgm:txFillClrLst>
+    <dgm:txEffectClrLst/>
+  </dgm:styleLbl>
+  <dgm:styleLbl name="solidAlignAcc1">
+    <dgm:fillClrLst meth="repeat">
+      <a:schemeClr val="lt1"/>
+    </dgm:fillClrLst>
+    <dgm:linClrLst meth="repeat">
+      <a:schemeClr val="accent1"/>
+    </dgm:linClrLst>
+    <dgm:effectClrLst/>
+    <dgm:txLinClrLst/>
+    <dgm:txFillClrLst meth="repeat">
+      <a:schemeClr val="dk1"/>
+    </dgm:txFillClrLst>
+    <dgm:txEffectClrLst/>
+  </dgm:styleLbl>
+  <dgm:styleLbl name="solidBgAcc1">
+    <dgm:fillClrLst meth="repeat">
+      <a:schemeClr val="lt1"/>
+    </dgm:fillClrLst>
+    <dgm:linClrLst meth="repeat">
+      <a:schemeClr val="accent1"/>
+    </dgm:linClrLst>
+    <dgm:effectClrLst/>
+    <dgm:txLinClrLst/>
+    <dgm:txFillClrLst meth="repeat">
+      <a:schemeClr val="dk1"/>
+    </dgm:txFillClrLst>
+    <dgm:txEffectClrLst/>
+  </dgm:styleLbl>
+  <dgm:styleLbl name="fgAccFollowNode1">
+    <dgm:fillClrLst meth="repeat">
+      <a:schemeClr val="accent1">
+        <a:alpha val="90000"/>
+        <a:tint val="40000"/>
+      </a:schemeClr>
+    </dgm:fillClrLst>
+    <dgm:linClrLst meth="repeat">
+      <a:schemeClr val="accent1">
+        <a:alpha val="90000"/>
+        <a:tint val="40000"/>
+      </a:schemeClr>
+    </dgm:linClrLst>
+    <dgm:effectClrLst/>
+    <dgm:txLinClrLst/>
+    <dgm:txFillClrLst meth="repeat">
+      <a:schemeClr val="dk1"/>
+    </dgm:txFillClrLst>
+    <dgm:txEffectClrLst/>
+  </dgm:styleLbl>
+  <dgm:styleLbl name="alignAccFollowNode1">
+    <dgm:fillClrLst meth="repeat">
+      <a:schemeClr val="accent1">
+        <a:alpha val="90000"/>
+        <a:tint val="40000"/>
+      </a:schemeClr>
+    </dgm:fillClrLst>
+    <dgm:linClrLst meth="repeat">
+      <a:schemeClr val="accent1">
+        <a:alpha val="90000"/>
+        <a:tint val="40000"/>
+      </a:schemeClr>
+    </dgm:linClrLst>
+    <dgm:effectClrLst/>
+    <dgm:txLinClrLst/>
+    <dgm:txFillClrLst meth="repeat">
+      <a:schemeClr val="dk1"/>
+    </dgm:txFillClrLst>
+    <dgm:txEffectClrLst/>
+  </dgm:styleLbl>
+  <dgm:styleLbl name="bgAccFollowNode1">
+    <dgm:fillClrLst meth="repeat">
+      <a:schemeClr val="accent1">
+        <a:alpha val="90000"/>
+        <a:tint val="40000"/>
+      </a:schemeClr>
+    </dgm:fillClrLst>
+    <dgm:linClrLst meth="repeat">
+      <a:schemeClr val="accent1">
+        <a:alpha val="90000"/>
+        <a:tint val="40000"/>
+      </a:schemeClr>
+    </dgm:linClrLst>
+    <dgm:effectClrLst/>
+    <dgm:txLinClrLst/>
+    <dgm:txFillClrLst meth="repeat">
+      <a:schemeClr val="dk1"/>
+    </dgm:txFillClrLst>
+    <dgm:txEffectClrLst/>
+  </dgm:styleLbl>
+  <dgm:styleLbl name="fgAcc0">
+    <dgm:fillClrLst meth="repeat">
+      <a:schemeClr val="lt1">
+        <a:alpha val="90000"/>
+      </a:schemeClr>
+    </dgm:fillClrLst>
+    <dgm:linClrLst meth="repeat">
+      <a:schemeClr val="accent1"/>
+    </dgm:linClrLst>
+    <dgm:effectClrLst/>
+    <dgm:txLinClrLst/>
+    <dgm:txFillClrLst meth="repeat">
+      <a:schemeClr val="dk1"/>
+    </dgm:txFillClrLst>
+    <dgm:txEffectClrLst/>
+  </dgm:styleLbl>
+  <dgm:styleLbl name="fgAcc2">
+    <dgm:fillClrLst meth="repeat">
+      <a:schemeClr val="lt1">
+        <a:alpha val="90000"/>
+      </a:schemeClr>
+    </dgm:fillClrLst>
+    <dgm:linClrLst meth="repeat">
+      <a:schemeClr val="accent1"/>
+    </dgm:linClrLst>
+    <dgm:effectClrLst/>
+    <dgm:txLinClrLst/>
+    <dgm:txFillClrLst meth="repeat">
+      <a:schemeClr val="dk1"/>
+    </dgm:txFillClrLst>
+    <dgm:txEffectClrLst/>
+  </dgm:styleLbl>
+  <dgm:styleLbl name="fgAcc3">
+    <dgm:fillClrLst meth="repeat">
+      <a:schemeClr val="lt1">
+        <a:alpha val="90000"/>
+      </a:schemeClr>
+    </dgm:fillClrLst>
+    <dgm:linClrLst meth="repeat">
+      <a:schemeClr val="accent1"/>
+    </dgm:linClrLst>
+    <dgm:effectClrLst/>
+    <dgm:txLinClrLst/>
+    <dgm:txFillClrLst meth="repeat">
+      <a:schemeClr val="dk1"/>
+    </dgm:txFillClrLst>
+    <dgm:txEffectClrLst/>
+  </dgm:styleLbl>
+  <dgm:styleLbl name="fgAcc4">
+    <dgm:fillClrLst meth="repeat">
+      <a:schemeClr val="lt1">
+        <a:alpha val="90000"/>
+      </a:schemeClr>
+    </dgm:fillClrLst>
+    <dgm:linClrLst meth="repeat">
+      <a:schemeClr val="accent1"/>
+    </dgm:linClrLst>
+    <dgm:effectClrLst/>
+    <dgm:txLinClrLst/>
+    <dgm:txFillClrLst meth="repeat">
+      <a:schemeClr val="dk1"/>
+    </dgm:txFillClrLst>
+    <dgm:txEffectClrLst/>
+  </dgm:styleLbl>
+  <dgm:styleLbl name="bgShp">
+    <dgm:fillClrLst meth="repeat">
+      <a:schemeClr val="accent1">
+        <a:tint val="40000"/>
+      </a:schemeClr>
+    </dgm:fillClrLst>
+    <dgm:linClrLst meth="repeat">
+      <a:schemeClr val="accent1"/>
+    </dgm:linClrLst>
+    <dgm:effectClrLst/>
+    <dgm:txLinClrLst/>
+    <dgm:txFillClrLst meth="repeat">
+      <a:schemeClr val="dk1"/>
+    </dgm:txFillClrLst>
+    <dgm:txEffectClrLst/>
+  </dgm:styleLbl>
+  <dgm:styleLbl name="dkBgShp">
+    <dgm:fillClrLst meth="repeat">
+      <a:schemeClr val="accent1">
+        <a:shade val="80000"/>
+      </a:schemeClr>
+    </dgm:fillClrLst>
+    <dgm:linClrLst meth="repeat">
+      <a:schemeClr val="accent1"/>
+    </dgm:linClrLst>
+    <dgm:effectClrLst/>
+    <dgm:txLinClrLst/>
+    <dgm:txFillClrLst meth="repeat">
+      <a:schemeClr val="lt1"/>
+    </dgm:txFillClrLst>
+    <dgm:txEffectClrLst/>
+  </dgm:styleLbl>
+  <dgm:styleLbl name="trBgShp">
+    <dgm:fillClrLst meth="repeat">
+      <a:schemeClr val="accent1">
+        <a:tint val="50000"/>
+        <a:alpha val="40000"/>
+      </a:schemeClr>
+    </dgm:fillClrLst>
+    <dgm:linClrLst meth="repeat">
+      <a:schemeClr val="accent1"/>
+    </dgm:linClrLst>
+    <dgm:effectClrLst/>
+    <dgm:txLinClrLst/>
+    <dgm:txFillClrLst meth="repeat">
+      <a:schemeClr val="lt1"/>
+    </dgm:txFillClrLst>
+    <dgm:txEffectClrLst/>
+  </dgm:styleLbl>
+  <dgm:styleLbl name="fgShp">
+    <dgm:fillClrLst meth="repeat">
+      <a:schemeClr val="accent1">
+        <a:tint val="60000"/>
+      </a:schemeClr>
+    </dgm:fillClrLst>
+    <dgm:linClrLst meth="repeat">
+      <a:schemeClr val="lt1"/>
+    </dgm:linClrLst>
+    <dgm:effectClrLst/>
+    <dgm:txLinClrLst/>
+    <dgm:txFillClrLst meth="repeat">
+      <a:schemeClr val="dk1"/>
+    </dgm:txFillClrLst>
+    <dgm:txEffectClrLst/>
+  </dgm:styleLbl>
+  <dgm:styleLbl name="revTx">
+    <dgm:fillClrLst meth="repeat">
+      <a:schemeClr val="lt1">
+        <a:alpha val="0"/>
+      </a:schemeClr>
+    </dgm:fillClrLst>
+    <dgm:linClrLst meth="repeat">
+      <a:schemeClr val="dk1">
+        <a:alpha val="0"/>
+      </a:schemeClr>
+    </dgm:linClrLst>
+    <dgm:effectClrLst/>
+    <dgm:txLinClrLst/>
+    <dgm:txFillClrLst meth="repeat">
+      <a:schemeClr val="tx1"/>
+    </dgm:txFillClrLst>
+    <dgm:txEffectClrLst/>
+  </dgm:styleLbl>
+</dgm:colorsDef>
+</file>
+
+<file path=ppt/diagrams/data1.xml><?xml version="1.0" encoding="utf-8"?>
+<dgm:dataModel xmlns:dgm="http://schemas.openxmlformats.org/drawingml/2006/diagram" xmlns:a="http://schemas.openxmlformats.org/drawingml/2006/main">
+  <dgm:ptLst>
+    <dgm:pt modelId="{C66C95AA-894B-4A1E-BB47-89DA2D5EF831}" type="doc">
+      <dgm:prSet loTypeId="urn:microsoft.com/office/officeart/2005/8/layout/process1" loCatId="process" qsTypeId="urn:microsoft.com/office/officeart/2005/8/quickstyle/simple1" qsCatId="simple" csTypeId="urn:microsoft.com/office/officeart/2005/8/colors/accent1_2" csCatId="accent1" phldr="1"/>
+      <dgm:spPr/>
+    </dgm:pt>
+    <dgm:pt modelId="{B7E26660-1290-49F7-B574-5924A9D9C507}">
+      <dgm:prSet phldrT="[Text]"/>
+      <dgm:spPr/>
+      <dgm:t>
+        <a:bodyPr/>
+        <a:lstStyle/>
+        <a:p>
+          <a:r>
+            <a:rPr lang="en-US" dirty="0"/>
+            <a:t>Excel</a:t>
+          </a:r>
+        </a:p>
+      </dgm:t>
+    </dgm:pt>
+    <dgm:pt modelId="{A519DA83-1865-414F-B6B6-D512530FD39C}" type="parTrans" cxnId="{59833F13-02B2-48D5-81A5-31215B8DB62B}">
+      <dgm:prSet/>
+      <dgm:spPr/>
+      <dgm:t>
+        <a:bodyPr/>
+        <a:lstStyle/>
+        <a:p>
+          <a:endParaRPr lang="en-US"/>
+        </a:p>
+      </dgm:t>
+    </dgm:pt>
+    <dgm:pt modelId="{A72DDC49-DFFD-45AC-9D62-621F7E754DCF}" type="sibTrans" cxnId="{59833F13-02B2-48D5-81A5-31215B8DB62B}">
+      <dgm:prSet/>
+      <dgm:spPr/>
+      <dgm:t>
+        <a:bodyPr/>
+        <a:lstStyle/>
+        <a:p>
+          <a:endParaRPr lang="en-US"/>
+        </a:p>
+      </dgm:t>
+    </dgm:pt>
+    <dgm:pt modelId="{E2DA349B-1EB3-486C-BCA4-4E987BD3CBD0}">
+      <dgm:prSet phldrT="[Text]"/>
+      <dgm:spPr/>
+      <dgm:t>
+        <a:bodyPr/>
+        <a:lstStyle/>
+        <a:p>
+          <a:r>
+            <a:rPr lang="en-US" dirty="0"/>
+            <a:t>Python Script</a:t>
+          </a:r>
+        </a:p>
+      </dgm:t>
+    </dgm:pt>
+    <dgm:pt modelId="{31FC5FE0-CBD5-4625-B1A8-209107DE6070}" type="parTrans" cxnId="{B9BD2970-86B7-40E2-A11D-62802E2D644F}">
+      <dgm:prSet/>
+      <dgm:spPr/>
+      <dgm:t>
+        <a:bodyPr/>
+        <a:lstStyle/>
+        <a:p>
+          <a:endParaRPr lang="en-US"/>
+        </a:p>
+      </dgm:t>
+    </dgm:pt>
+    <dgm:pt modelId="{70DB3C7D-ADA3-4E56-8DE6-EE543A71262C}" type="sibTrans" cxnId="{B9BD2970-86B7-40E2-A11D-62802E2D644F}">
+      <dgm:prSet/>
+      <dgm:spPr/>
+      <dgm:t>
+        <a:bodyPr/>
+        <a:lstStyle/>
+        <a:p>
+          <a:endParaRPr lang="en-US"/>
+        </a:p>
+      </dgm:t>
+    </dgm:pt>
+    <dgm:pt modelId="{31E41493-9438-4F04-99F8-4BD247E9DE77}">
+      <dgm:prSet phldrT="[Text]"/>
+      <dgm:spPr/>
+      <dgm:t>
+        <a:bodyPr/>
+        <a:lstStyle/>
+        <a:p>
+          <a:r>
+            <a:rPr lang="en-US" dirty="0"/>
+            <a:t>SQL Inserts</a:t>
+          </a:r>
+        </a:p>
+      </dgm:t>
+    </dgm:pt>
+    <dgm:pt modelId="{D06BF950-6C9B-4C4E-BF6B-1353626071A8}" type="parTrans" cxnId="{7E8CEF81-3D33-44A5-99B1-E2030E2EF8D5}">
+      <dgm:prSet/>
+      <dgm:spPr/>
+      <dgm:t>
+        <a:bodyPr/>
+        <a:lstStyle/>
+        <a:p>
+          <a:endParaRPr lang="en-US"/>
+        </a:p>
+      </dgm:t>
+    </dgm:pt>
+    <dgm:pt modelId="{2D0E7A1C-E778-40B6-B6BF-95365C85EBB3}" type="sibTrans" cxnId="{7E8CEF81-3D33-44A5-99B1-E2030E2EF8D5}">
+      <dgm:prSet/>
+      <dgm:spPr/>
+      <dgm:t>
+        <a:bodyPr/>
+        <a:lstStyle/>
+        <a:p>
+          <a:endParaRPr lang="en-US"/>
+        </a:p>
+      </dgm:t>
+    </dgm:pt>
+    <dgm:pt modelId="{5CAE2650-8C01-4640-AE53-17066890E8DD}">
+      <dgm:prSet phldrT="[Text]"/>
+      <dgm:spPr/>
+      <dgm:t>
+        <a:bodyPr/>
+        <a:lstStyle/>
+        <a:p>
+          <a:r>
+            <a:rPr lang="en-US" dirty="0"/>
+            <a:t>SSMS Inserts</a:t>
+          </a:r>
+        </a:p>
+      </dgm:t>
+    </dgm:pt>
+    <dgm:pt modelId="{B60D01BC-D88B-4CC3-ADBF-89D40EC0400F}" type="parTrans" cxnId="{716474F0-BFAA-4368-8ED0-B0079CE34EBD}">
+      <dgm:prSet/>
+      <dgm:spPr/>
+      <dgm:t>
+        <a:bodyPr/>
+        <a:lstStyle/>
+        <a:p>
+          <a:endParaRPr lang="en-US"/>
+        </a:p>
+      </dgm:t>
+    </dgm:pt>
+    <dgm:pt modelId="{B5F6F478-6BB7-448C-9A57-9ECEC983A44F}" type="sibTrans" cxnId="{716474F0-BFAA-4368-8ED0-B0079CE34EBD}">
+      <dgm:prSet/>
+      <dgm:spPr/>
+      <dgm:t>
+        <a:bodyPr/>
+        <a:lstStyle/>
+        <a:p>
+          <a:endParaRPr lang="en-US"/>
+        </a:p>
+      </dgm:t>
+    </dgm:pt>
+    <dgm:pt modelId="{D1D2768C-BFC3-47AD-B6CB-1810EE068B22}" type="pres">
+      <dgm:prSet presAssocID="{C66C95AA-894B-4A1E-BB47-89DA2D5EF831}" presName="Name0" presStyleCnt="0">
+        <dgm:presLayoutVars>
+          <dgm:dir/>
+          <dgm:resizeHandles val="exact"/>
+        </dgm:presLayoutVars>
+      </dgm:prSet>
+      <dgm:spPr/>
+    </dgm:pt>
+    <dgm:pt modelId="{32529A18-D10F-4DE6-9869-649124EA050A}" type="pres">
+      <dgm:prSet presAssocID="{B7E26660-1290-49F7-B574-5924A9D9C507}" presName="node" presStyleLbl="node1" presStyleIdx="0" presStyleCnt="4">
+        <dgm:presLayoutVars>
+          <dgm:bulletEnabled val="1"/>
+        </dgm:presLayoutVars>
+      </dgm:prSet>
+      <dgm:spPr/>
+    </dgm:pt>
+    <dgm:pt modelId="{B8911FA7-DBA9-48B7-80A2-1D711A8AB55D}" type="pres">
+      <dgm:prSet presAssocID="{A72DDC49-DFFD-45AC-9D62-621F7E754DCF}" presName="sibTrans" presStyleLbl="sibTrans2D1" presStyleIdx="0" presStyleCnt="3"/>
+      <dgm:spPr/>
+    </dgm:pt>
+    <dgm:pt modelId="{350FAA0F-A60C-44D4-A6BB-BE6EAD2F8ADE}" type="pres">
+      <dgm:prSet presAssocID="{A72DDC49-DFFD-45AC-9D62-621F7E754DCF}" presName="connectorText" presStyleLbl="sibTrans2D1" presStyleIdx="0" presStyleCnt="3"/>
+      <dgm:spPr/>
+    </dgm:pt>
+    <dgm:pt modelId="{84884138-DAC7-42A7-9772-A880FA24488B}" type="pres">
+      <dgm:prSet presAssocID="{E2DA349B-1EB3-486C-BCA4-4E987BD3CBD0}" presName="node" presStyleLbl="node1" presStyleIdx="1" presStyleCnt="4">
+        <dgm:presLayoutVars>
+          <dgm:bulletEnabled val="1"/>
+        </dgm:presLayoutVars>
+      </dgm:prSet>
+      <dgm:spPr/>
+    </dgm:pt>
+    <dgm:pt modelId="{3C52E76A-D37F-45B6-B342-13A0A746E085}" type="pres">
+      <dgm:prSet presAssocID="{70DB3C7D-ADA3-4E56-8DE6-EE543A71262C}" presName="sibTrans" presStyleLbl="sibTrans2D1" presStyleIdx="1" presStyleCnt="3"/>
+      <dgm:spPr/>
+    </dgm:pt>
+    <dgm:pt modelId="{EC78AB04-3E3F-4002-AC35-2E4D38D04AA7}" type="pres">
+      <dgm:prSet presAssocID="{70DB3C7D-ADA3-4E56-8DE6-EE543A71262C}" presName="connectorText" presStyleLbl="sibTrans2D1" presStyleIdx="1" presStyleCnt="3"/>
+      <dgm:spPr/>
+    </dgm:pt>
+    <dgm:pt modelId="{41CC73F9-98C2-473B-A669-1E92B375E74B}" type="pres">
+      <dgm:prSet presAssocID="{31E41493-9438-4F04-99F8-4BD247E9DE77}" presName="node" presStyleLbl="node1" presStyleIdx="2" presStyleCnt="4">
+        <dgm:presLayoutVars>
+          <dgm:bulletEnabled val="1"/>
+        </dgm:presLayoutVars>
+      </dgm:prSet>
+      <dgm:spPr/>
+    </dgm:pt>
+    <dgm:pt modelId="{3AEE4966-24E7-4087-A9BF-F2B4889CC7C6}" type="pres">
+      <dgm:prSet presAssocID="{2D0E7A1C-E778-40B6-B6BF-95365C85EBB3}" presName="sibTrans" presStyleLbl="sibTrans2D1" presStyleIdx="2" presStyleCnt="3"/>
+      <dgm:spPr/>
+    </dgm:pt>
+    <dgm:pt modelId="{49CD884E-6D1E-4096-B3F4-AD61234AC988}" type="pres">
+      <dgm:prSet presAssocID="{2D0E7A1C-E778-40B6-B6BF-95365C85EBB3}" presName="connectorText" presStyleLbl="sibTrans2D1" presStyleIdx="2" presStyleCnt="3"/>
+      <dgm:spPr/>
+    </dgm:pt>
+    <dgm:pt modelId="{6AA5E70A-B1A7-44D8-8F87-E74594E5F1F5}" type="pres">
+      <dgm:prSet presAssocID="{5CAE2650-8C01-4640-AE53-17066890E8DD}" presName="node" presStyleLbl="node1" presStyleIdx="3" presStyleCnt="4">
+        <dgm:presLayoutVars>
+          <dgm:bulletEnabled val="1"/>
+        </dgm:presLayoutVars>
+      </dgm:prSet>
+      <dgm:spPr/>
+    </dgm:pt>
+  </dgm:ptLst>
+  <dgm:cxnLst>
+    <dgm:cxn modelId="{E8609C08-302B-4D39-8058-07ED4252CABC}" type="presOf" srcId="{E2DA349B-1EB3-486C-BCA4-4E987BD3CBD0}" destId="{84884138-DAC7-42A7-9772-A880FA24488B}" srcOrd="0" destOrd="0" presId="urn:microsoft.com/office/officeart/2005/8/layout/process1"/>
+    <dgm:cxn modelId="{59833F13-02B2-48D5-81A5-31215B8DB62B}" srcId="{C66C95AA-894B-4A1E-BB47-89DA2D5EF831}" destId="{B7E26660-1290-49F7-B574-5924A9D9C507}" srcOrd="0" destOrd="0" parTransId="{A519DA83-1865-414F-B6B6-D512530FD39C}" sibTransId="{A72DDC49-DFFD-45AC-9D62-621F7E754DCF}"/>
+    <dgm:cxn modelId="{44AE642F-C5A5-4783-ABC2-DD36211034DD}" type="presOf" srcId="{2D0E7A1C-E778-40B6-B6BF-95365C85EBB3}" destId="{49CD884E-6D1E-4096-B3F4-AD61234AC988}" srcOrd="1" destOrd="0" presId="urn:microsoft.com/office/officeart/2005/8/layout/process1"/>
+    <dgm:cxn modelId="{B9BD2970-86B7-40E2-A11D-62802E2D644F}" srcId="{C66C95AA-894B-4A1E-BB47-89DA2D5EF831}" destId="{E2DA349B-1EB3-486C-BCA4-4E987BD3CBD0}" srcOrd="1" destOrd="0" parTransId="{31FC5FE0-CBD5-4625-B1A8-209107DE6070}" sibTransId="{70DB3C7D-ADA3-4E56-8DE6-EE543A71262C}"/>
+    <dgm:cxn modelId="{7E8CEF81-3D33-44A5-99B1-E2030E2EF8D5}" srcId="{C66C95AA-894B-4A1E-BB47-89DA2D5EF831}" destId="{31E41493-9438-4F04-99F8-4BD247E9DE77}" srcOrd="2" destOrd="0" parTransId="{D06BF950-6C9B-4C4E-BF6B-1353626071A8}" sibTransId="{2D0E7A1C-E778-40B6-B6BF-95365C85EBB3}"/>
+    <dgm:cxn modelId="{DAAAB884-A38E-47F4-BF4A-3863336D8F74}" type="presOf" srcId="{31E41493-9438-4F04-99F8-4BD247E9DE77}" destId="{41CC73F9-98C2-473B-A669-1E92B375E74B}" srcOrd="0" destOrd="0" presId="urn:microsoft.com/office/officeart/2005/8/layout/process1"/>
+    <dgm:cxn modelId="{0A3AD78B-61E9-473C-87FB-B031B3D19F30}" type="presOf" srcId="{2D0E7A1C-E778-40B6-B6BF-95365C85EBB3}" destId="{3AEE4966-24E7-4087-A9BF-F2B4889CC7C6}" srcOrd="0" destOrd="0" presId="urn:microsoft.com/office/officeart/2005/8/layout/process1"/>
+    <dgm:cxn modelId="{A4BB418D-E119-4658-BA4E-729EE65C8358}" type="presOf" srcId="{B7E26660-1290-49F7-B574-5924A9D9C507}" destId="{32529A18-D10F-4DE6-9869-649124EA050A}" srcOrd="0" destOrd="0" presId="urn:microsoft.com/office/officeart/2005/8/layout/process1"/>
+    <dgm:cxn modelId="{AB89EB9A-16B2-4FF6-92BB-3912C29BE3D5}" type="presOf" srcId="{A72DDC49-DFFD-45AC-9D62-621F7E754DCF}" destId="{B8911FA7-DBA9-48B7-80A2-1D711A8AB55D}" srcOrd="0" destOrd="0" presId="urn:microsoft.com/office/officeart/2005/8/layout/process1"/>
+    <dgm:cxn modelId="{8A91FC9F-BF6E-432B-8F53-AD0CCA8CB9EA}" type="presOf" srcId="{70DB3C7D-ADA3-4E56-8DE6-EE543A71262C}" destId="{EC78AB04-3E3F-4002-AC35-2E4D38D04AA7}" srcOrd="1" destOrd="0" presId="urn:microsoft.com/office/officeart/2005/8/layout/process1"/>
+    <dgm:cxn modelId="{C0C6EEAB-5BC4-45D8-886E-BFF5DAA5130D}" type="presOf" srcId="{5CAE2650-8C01-4640-AE53-17066890E8DD}" destId="{6AA5E70A-B1A7-44D8-8F87-E74594E5F1F5}" srcOrd="0" destOrd="0" presId="urn:microsoft.com/office/officeart/2005/8/layout/process1"/>
+    <dgm:cxn modelId="{5139FDD6-5919-4276-AAB3-FA7C2BBF74B0}" type="presOf" srcId="{A72DDC49-DFFD-45AC-9D62-621F7E754DCF}" destId="{350FAA0F-A60C-44D4-A6BB-BE6EAD2F8ADE}" srcOrd="1" destOrd="0" presId="urn:microsoft.com/office/officeart/2005/8/layout/process1"/>
+    <dgm:cxn modelId="{56F18EED-16D2-4DB2-9156-E234E0FB1DED}" type="presOf" srcId="{C66C95AA-894B-4A1E-BB47-89DA2D5EF831}" destId="{D1D2768C-BFC3-47AD-B6CB-1810EE068B22}" srcOrd="0" destOrd="0" presId="urn:microsoft.com/office/officeart/2005/8/layout/process1"/>
+    <dgm:cxn modelId="{716474F0-BFAA-4368-8ED0-B0079CE34EBD}" srcId="{C66C95AA-894B-4A1E-BB47-89DA2D5EF831}" destId="{5CAE2650-8C01-4640-AE53-17066890E8DD}" srcOrd="3" destOrd="0" parTransId="{B60D01BC-D88B-4CC3-ADBF-89D40EC0400F}" sibTransId="{B5F6F478-6BB7-448C-9A57-9ECEC983A44F}"/>
+    <dgm:cxn modelId="{8D9AC5FC-E49E-406D-BEA6-A3DD04F319E1}" type="presOf" srcId="{70DB3C7D-ADA3-4E56-8DE6-EE543A71262C}" destId="{3C52E76A-D37F-45B6-B342-13A0A746E085}" srcOrd="0" destOrd="0" presId="urn:microsoft.com/office/officeart/2005/8/layout/process1"/>
+    <dgm:cxn modelId="{A80EE6FD-9B42-4FA9-B668-EB904BFB09C0}" type="presParOf" srcId="{D1D2768C-BFC3-47AD-B6CB-1810EE068B22}" destId="{32529A18-D10F-4DE6-9869-649124EA050A}" srcOrd="0" destOrd="0" presId="urn:microsoft.com/office/officeart/2005/8/layout/process1"/>
+    <dgm:cxn modelId="{AEED0F88-1421-4BE1-BA9F-0B7FFF1C2CD6}" type="presParOf" srcId="{D1D2768C-BFC3-47AD-B6CB-1810EE068B22}" destId="{B8911FA7-DBA9-48B7-80A2-1D711A8AB55D}" srcOrd="1" destOrd="0" presId="urn:microsoft.com/office/officeart/2005/8/layout/process1"/>
+    <dgm:cxn modelId="{DE527948-F101-424E-95CB-AFE4CE0BD78F}" type="presParOf" srcId="{B8911FA7-DBA9-48B7-80A2-1D711A8AB55D}" destId="{350FAA0F-A60C-44D4-A6BB-BE6EAD2F8ADE}" srcOrd="0" destOrd="0" presId="urn:microsoft.com/office/officeart/2005/8/layout/process1"/>
+    <dgm:cxn modelId="{A4FA2B4B-AD37-486B-86AA-DE4128DA731A}" type="presParOf" srcId="{D1D2768C-BFC3-47AD-B6CB-1810EE068B22}" destId="{84884138-DAC7-42A7-9772-A880FA24488B}" srcOrd="2" destOrd="0" presId="urn:microsoft.com/office/officeart/2005/8/layout/process1"/>
+    <dgm:cxn modelId="{C0A9E2AC-DD00-4677-B84F-63418CFC8D40}" type="presParOf" srcId="{D1D2768C-BFC3-47AD-B6CB-1810EE068B22}" destId="{3C52E76A-D37F-45B6-B342-13A0A746E085}" srcOrd="3" destOrd="0" presId="urn:microsoft.com/office/officeart/2005/8/layout/process1"/>
+    <dgm:cxn modelId="{235F6307-4054-49FC-B9AE-F422B21BBCDC}" type="presParOf" srcId="{3C52E76A-D37F-45B6-B342-13A0A746E085}" destId="{EC78AB04-3E3F-4002-AC35-2E4D38D04AA7}" srcOrd="0" destOrd="0" presId="urn:microsoft.com/office/officeart/2005/8/layout/process1"/>
+    <dgm:cxn modelId="{7A37F7F2-87CD-4B7E-96C4-E5E6A6EB2E0B}" type="presParOf" srcId="{D1D2768C-BFC3-47AD-B6CB-1810EE068B22}" destId="{41CC73F9-98C2-473B-A669-1E92B375E74B}" srcOrd="4" destOrd="0" presId="urn:microsoft.com/office/officeart/2005/8/layout/process1"/>
+    <dgm:cxn modelId="{D25DCE63-8591-4780-BF3D-EF41C318D6B2}" type="presParOf" srcId="{D1D2768C-BFC3-47AD-B6CB-1810EE068B22}" destId="{3AEE4966-24E7-4087-A9BF-F2B4889CC7C6}" srcOrd="5" destOrd="0" presId="urn:microsoft.com/office/officeart/2005/8/layout/process1"/>
+    <dgm:cxn modelId="{299B2F96-0339-417F-9C43-A44462349B45}" type="presParOf" srcId="{3AEE4966-24E7-4087-A9BF-F2B4889CC7C6}" destId="{49CD884E-6D1E-4096-B3F4-AD61234AC988}" srcOrd="0" destOrd="0" presId="urn:microsoft.com/office/officeart/2005/8/layout/process1"/>
+    <dgm:cxn modelId="{21D00EC2-53B5-4683-859D-0C6F7CEA0130}" type="presParOf" srcId="{D1D2768C-BFC3-47AD-B6CB-1810EE068B22}" destId="{6AA5E70A-B1A7-44D8-8F87-E74594E5F1F5}" srcOrd="6" destOrd="0" presId="urn:microsoft.com/office/officeart/2005/8/layout/process1"/>
+  </dgm:cxnLst>
+  <dgm:bg/>
+  <dgm:whole/>
+  <dgm:extLst>
+    <a:ext uri="http://schemas.microsoft.com/office/drawing/2008/diagram">
+      <dsp:dataModelExt xmlns:dsp="http://schemas.microsoft.com/office/drawing/2008/diagram" relId="rId6" minVer="http://schemas.openxmlformats.org/drawingml/2006/diagram"/>
+    </a:ext>
+  </dgm:extLst>
+</dgm:dataModel>
+</file>
+
+<file path=ppt/diagrams/drawing1.xml><?xml version="1.0" encoding="utf-8"?>
+<dsp:drawing xmlns:dgm="http://schemas.openxmlformats.org/drawingml/2006/diagram" xmlns:dsp="http://schemas.microsoft.com/office/drawing/2008/diagram" xmlns:a="http://schemas.openxmlformats.org/drawingml/2006/main">
+  <dsp:spTree>
+    <dsp:nvGrpSpPr>
+      <dsp:cNvPr id="0" name=""/>
+      <dsp:cNvGrpSpPr/>
+    </dsp:nvGrpSpPr>
+    <dsp:grpSpPr/>
+    <dsp:sp modelId="{32529A18-D10F-4DE6-9869-649124EA050A}">
+      <dsp:nvSpPr>
+        <dsp:cNvPr id="0" name=""/>
+        <dsp:cNvSpPr/>
+      </dsp:nvSpPr>
+      <dsp:spPr>
+        <a:xfrm>
+          <a:off x="3242" y="1851536"/>
+          <a:ext cx="1417662" cy="850597"/>
+        </a:xfrm>
+        <a:prstGeom prst="roundRect">
+          <a:avLst>
+            <a:gd name="adj" fmla="val 10000"/>
+          </a:avLst>
+        </a:prstGeom>
+        <a:solidFill>
+          <a:schemeClr val="accent1">
+            <a:hueOff val="0"/>
+            <a:satOff val="0"/>
+            <a:lumOff val="0"/>
+            <a:alphaOff val="0"/>
+          </a:schemeClr>
+        </a:solidFill>
+        <a:ln w="19050" cap="flat" cmpd="sng" algn="ctr">
+          <a:solidFill>
+            <a:schemeClr val="lt1">
+              <a:hueOff val="0"/>
+              <a:satOff val="0"/>
+              <a:lumOff val="0"/>
+              <a:alphaOff val="0"/>
+            </a:schemeClr>
+          </a:solidFill>
+          <a:prstDash val="solid"/>
+        </a:ln>
+        <a:effectLst/>
+      </dsp:spPr>
+      <dsp:style>
+        <a:lnRef idx="2">
+          <a:scrgbClr r="0" g="0" b="0"/>
+        </a:lnRef>
+        <a:fillRef idx="1">
+          <a:scrgbClr r="0" g="0" b="0"/>
+        </a:fillRef>
+        <a:effectRef idx="0">
+          <a:scrgbClr r="0" g="0" b="0"/>
+        </a:effectRef>
+        <a:fontRef idx="minor">
+          <a:schemeClr val="lt1"/>
+        </a:fontRef>
+      </dsp:style>
+      <dsp:txBody>
+        <a:bodyPr spcFirstLastPara="0" vert="horz" wrap="square" lIns="87630" tIns="87630" rIns="87630" bIns="87630" numCol="1" spcCol="1270" anchor="ctr" anchorCtr="0">
+          <a:noAutofit/>
+        </a:bodyPr>
+        <a:lstStyle/>
+        <a:p>
+          <a:pPr marL="0" lvl="0" indent="0" algn="ctr" defTabSz="1022350">
+            <a:lnSpc>
+              <a:spcPct val="90000"/>
+            </a:lnSpc>
+            <a:spcBef>
+              <a:spcPct val="0"/>
+            </a:spcBef>
+            <a:spcAft>
+              <a:spcPct val="35000"/>
+            </a:spcAft>
+            <a:buNone/>
+          </a:pPr>
+          <a:r>
+            <a:rPr lang="en-US" sz="2300" kern="1200" dirty="0"/>
+            <a:t>Excel</a:t>
+          </a:r>
+        </a:p>
+      </dsp:txBody>
+      <dsp:txXfrm>
+        <a:off x="28155" y="1876449"/>
+        <a:ext cx="1367836" cy="800771"/>
+      </dsp:txXfrm>
+    </dsp:sp>
+    <dsp:sp modelId="{B8911FA7-DBA9-48B7-80A2-1D711A8AB55D}">
+      <dsp:nvSpPr>
+        <dsp:cNvPr id="0" name=""/>
+        <dsp:cNvSpPr/>
+      </dsp:nvSpPr>
+      <dsp:spPr>
+        <a:xfrm>
+          <a:off x="1562671" y="2101044"/>
+          <a:ext cx="300544" cy="351580"/>
+        </a:xfrm>
+        <a:prstGeom prst="rightArrow">
+          <a:avLst>
+            <a:gd name="adj1" fmla="val 60000"/>
+            <a:gd name="adj2" fmla="val 50000"/>
+          </a:avLst>
+        </a:prstGeom>
+        <a:solidFill>
+          <a:schemeClr val="accent1">
+            <a:tint val="60000"/>
+            <a:hueOff val="0"/>
+            <a:satOff val="0"/>
+            <a:lumOff val="0"/>
+            <a:alphaOff val="0"/>
+          </a:schemeClr>
+        </a:solidFill>
+        <a:ln>
+          <a:noFill/>
+        </a:ln>
+        <a:effectLst/>
+      </dsp:spPr>
+      <dsp:style>
+        <a:lnRef idx="0">
+          <a:scrgbClr r="0" g="0" b="0"/>
+        </a:lnRef>
+        <a:fillRef idx="1">
+          <a:scrgbClr r="0" g="0" b="0"/>
+        </a:fillRef>
+        <a:effectRef idx="0">
+          <a:scrgbClr r="0" g="0" b="0"/>
+        </a:effectRef>
+        <a:fontRef idx="minor">
+          <a:schemeClr val="lt1"/>
+        </a:fontRef>
+      </dsp:style>
+      <dsp:txBody>
+        <a:bodyPr spcFirstLastPara="0" vert="horz" wrap="square" lIns="0" tIns="0" rIns="0" bIns="0" numCol="1" spcCol="1270" anchor="ctr" anchorCtr="0">
+          <a:noAutofit/>
+        </a:bodyPr>
+        <a:lstStyle/>
+        <a:p>
+          <a:pPr marL="0" lvl="0" indent="0" algn="ctr" defTabSz="666750">
+            <a:lnSpc>
+              <a:spcPct val="90000"/>
+            </a:lnSpc>
+            <a:spcBef>
+              <a:spcPct val="0"/>
+            </a:spcBef>
+            <a:spcAft>
+              <a:spcPct val="35000"/>
+            </a:spcAft>
+            <a:buNone/>
+          </a:pPr>
+          <a:endParaRPr lang="en-US" sz="1500" kern="1200"/>
+        </a:p>
+      </dsp:txBody>
+      <dsp:txXfrm>
+        <a:off x="1562671" y="2171360"/>
+        <a:ext cx="210381" cy="210948"/>
+      </dsp:txXfrm>
+    </dsp:sp>
+    <dsp:sp modelId="{84884138-DAC7-42A7-9772-A880FA24488B}">
+      <dsp:nvSpPr>
+        <dsp:cNvPr id="0" name=""/>
+        <dsp:cNvSpPr/>
+      </dsp:nvSpPr>
+      <dsp:spPr>
+        <a:xfrm>
+          <a:off x="1987969" y="1851536"/>
+          <a:ext cx="1417662" cy="850597"/>
+        </a:xfrm>
+        <a:prstGeom prst="roundRect">
+          <a:avLst>
+            <a:gd name="adj" fmla="val 10000"/>
+          </a:avLst>
+        </a:prstGeom>
+        <a:solidFill>
+          <a:schemeClr val="accent1">
+            <a:hueOff val="0"/>
+            <a:satOff val="0"/>
+            <a:lumOff val="0"/>
+            <a:alphaOff val="0"/>
+          </a:schemeClr>
+        </a:solidFill>
+        <a:ln w="19050" cap="flat" cmpd="sng" algn="ctr">
+          <a:solidFill>
+            <a:schemeClr val="lt1">
+              <a:hueOff val="0"/>
+              <a:satOff val="0"/>
+              <a:lumOff val="0"/>
+              <a:alphaOff val="0"/>
+            </a:schemeClr>
+          </a:solidFill>
+          <a:prstDash val="solid"/>
+        </a:ln>
+        <a:effectLst/>
+      </dsp:spPr>
+      <dsp:style>
+        <a:lnRef idx="2">
+          <a:scrgbClr r="0" g="0" b="0"/>
+        </a:lnRef>
+        <a:fillRef idx="1">
+          <a:scrgbClr r="0" g="0" b="0"/>
+        </a:fillRef>
+        <a:effectRef idx="0">
+          <a:scrgbClr r="0" g="0" b="0"/>
+        </a:effectRef>
+        <a:fontRef idx="minor">
+          <a:schemeClr val="lt1"/>
+        </a:fontRef>
+      </dsp:style>
+      <dsp:txBody>
+        <a:bodyPr spcFirstLastPara="0" vert="horz" wrap="square" lIns="87630" tIns="87630" rIns="87630" bIns="87630" numCol="1" spcCol="1270" anchor="ctr" anchorCtr="0">
+          <a:noAutofit/>
+        </a:bodyPr>
+        <a:lstStyle/>
+        <a:p>
+          <a:pPr marL="0" lvl="0" indent="0" algn="ctr" defTabSz="1022350">
+            <a:lnSpc>
+              <a:spcPct val="90000"/>
+            </a:lnSpc>
+            <a:spcBef>
+              <a:spcPct val="0"/>
+            </a:spcBef>
+            <a:spcAft>
+              <a:spcPct val="35000"/>
+            </a:spcAft>
+            <a:buNone/>
+          </a:pPr>
+          <a:r>
+            <a:rPr lang="en-US" sz="2300" kern="1200" dirty="0"/>
+            <a:t>Python Script</a:t>
+          </a:r>
+        </a:p>
+      </dsp:txBody>
+      <dsp:txXfrm>
+        <a:off x="2012882" y="1876449"/>
+        <a:ext cx="1367836" cy="800771"/>
+      </dsp:txXfrm>
+    </dsp:sp>
+    <dsp:sp modelId="{3C52E76A-D37F-45B6-B342-13A0A746E085}">
+      <dsp:nvSpPr>
+        <dsp:cNvPr id="0" name=""/>
+        <dsp:cNvSpPr/>
+      </dsp:nvSpPr>
+      <dsp:spPr>
+        <a:xfrm>
+          <a:off x="3547398" y="2101044"/>
+          <a:ext cx="300544" cy="351580"/>
+        </a:xfrm>
+        <a:prstGeom prst="rightArrow">
+          <a:avLst>
+            <a:gd name="adj1" fmla="val 60000"/>
+            <a:gd name="adj2" fmla="val 50000"/>
+          </a:avLst>
+        </a:prstGeom>
+        <a:solidFill>
+          <a:schemeClr val="accent1">
+            <a:tint val="60000"/>
+            <a:hueOff val="0"/>
+            <a:satOff val="0"/>
+            <a:lumOff val="0"/>
+            <a:alphaOff val="0"/>
+          </a:schemeClr>
+        </a:solidFill>
+        <a:ln>
+          <a:noFill/>
+        </a:ln>
+        <a:effectLst/>
+      </dsp:spPr>
+      <dsp:style>
+        <a:lnRef idx="0">
+          <a:scrgbClr r="0" g="0" b="0"/>
+        </a:lnRef>
+        <a:fillRef idx="1">
+          <a:scrgbClr r="0" g="0" b="0"/>
+        </a:fillRef>
+        <a:effectRef idx="0">
+          <a:scrgbClr r="0" g="0" b="0"/>
+        </a:effectRef>
+        <a:fontRef idx="minor">
+          <a:schemeClr val="lt1"/>
+        </a:fontRef>
+      </dsp:style>
+      <dsp:txBody>
+        <a:bodyPr spcFirstLastPara="0" vert="horz" wrap="square" lIns="0" tIns="0" rIns="0" bIns="0" numCol="1" spcCol="1270" anchor="ctr" anchorCtr="0">
+          <a:noAutofit/>
+        </a:bodyPr>
+        <a:lstStyle/>
+        <a:p>
+          <a:pPr marL="0" lvl="0" indent="0" algn="ctr" defTabSz="666750">
+            <a:lnSpc>
+              <a:spcPct val="90000"/>
+            </a:lnSpc>
+            <a:spcBef>
+              <a:spcPct val="0"/>
+            </a:spcBef>
+            <a:spcAft>
+              <a:spcPct val="35000"/>
+            </a:spcAft>
+            <a:buNone/>
+          </a:pPr>
+          <a:endParaRPr lang="en-US" sz="1500" kern="1200"/>
+        </a:p>
+      </dsp:txBody>
+      <dsp:txXfrm>
+        <a:off x="3547398" y="2171360"/>
+        <a:ext cx="210381" cy="210948"/>
+      </dsp:txXfrm>
+    </dsp:sp>
+    <dsp:sp modelId="{41CC73F9-98C2-473B-A669-1E92B375E74B}">
+      <dsp:nvSpPr>
+        <dsp:cNvPr id="0" name=""/>
+        <dsp:cNvSpPr/>
+      </dsp:nvSpPr>
+      <dsp:spPr>
+        <a:xfrm>
+          <a:off x="3972697" y="1851536"/>
+          <a:ext cx="1417662" cy="850597"/>
+        </a:xfrm>
+        <a:prstGeom prst="roundRect">
+          <a:avLst>
+            <a:gd name="adj" fmla="val 10000"/>
+          </a:avLst>
+        </a:prstGeom>
+        <a:solidFill>
+          <a:schemeClr val="accent1">
+            <a:hueOff val="0"/>
+            <a:satOff val="0"/>
+            <a:lumOff val="0"/>
+            <a:alphaOff val="0"/>
+          </a:schemeClr>
+        </a:solidFill>
+        <a:ln w="19050" cap="flat" cmpd="sng" algn="ctr">
+          <a:solidFill>
+            <a:schemeClr val="lt1">
+              <a:hueOff val="0"/>
+              <a:satOff val="0"/>
+              <a:lumOff val="0"/>
+              <a:alphaOff val="0"/>
+            </a:schemeClr>
+          </a:solidFill>
+          <a:prstDash val="solid"/>
+        </a:ln>
+        <a:effectLst/>
+      </dsp:spPr>
+      <dsp:style>
+        <a:lnRef idx="2">
+          <a:scrgbClr r="0" g="0" b="0"/>
+        </a:lnRef>
+        <a:fillRef idx="1">
+          <a:scrgbClr r="0" g="0" b="0"/>
+        </a:fillRef>
+        <a:effectRef idx="0">
+          <a:scrgbClr r="0" g="0" b="0"/>
+        </a:effectRef>
+        <a:fontRef idx="minor">
+          <a:schemeClr val="lt1"/>
+        </a:fontRef>
+      </dsp:style>
+      <dsp:txBody>
+        <a:bodyPr spcFirstLastPara="0" vert="horz" wrap="square" lIns="87630" tIns="87630" rIns="87630" bIns="87630" numCol="1" spcCol="1270" anchor="ctr" anchorCtr="0">
+          <a:noAutofit/>
+        </a:bodyPr>
+        <a:lstStyle/>
+        <a:p>
+          <a:pPr marL="0" lvl="0" indent="0" algn="ctr" defTabSz="1022350">
+            <a:lnSpc>
+              <a:spcPct val="90000"/>
+            </a:lnSpc>
+            <a:spcBef>
+              <a:spcPct val="0"/>
+            </a:spcBef>
+            <a:spcAft>
+              <a:spcPct val="35000"/>
+            </a:spcAft>
+            <a:buNone/>
+          </a:pPr>
+          <a:r>
+            <a:rPr lang="en-US" sz="2300" kern="1200" dirty="0"/>
+            <a:t>SQL Inserts</a:t>
+          </a:r>
+        </a:p>
+      </dsp:txBody>
+      <dsp:txXfrm>
+        <a:off x="3997610" y="1876449"/>
+        <a:ext cx="1367836" cy="800771"/>
+      </dsp:txXfrm>
+    </dsp:sp>
+    <dsp:sp modelId="{3AEE4966-24E7-4087-A9BF-F2B4889CC7C6}">
+      <dsp:nvSpPr>
+        <dsp:cNvPr id="0" name=""/>
+        <dsp:cNvSpPr/>
+      </dsp:nvSpPr>
+      <dsp:spPr>
+        <a:xfrm>
+          <a:off x="5532126" y="2101044"/>
+          <a:ext cx="300544" cy="351580"/>
+        </a:xfrm>
+        <a:prstGeom prst="rightArrow">
+          <a:avLst>
+            <a:gd name="adj1" fmla="val 60000"/>
+            <a:gd name="adj2" fmla="val 50000"/>
+          </a:avLst>
+        </a:prstGeom>
+        <a:solidFill>
+          <a:schemeClr val="accent1">
+            <a:tint val="60000"/>
+            <a:hueOff val="0"/>
+            <a:satOff val="0"/>
+            <a:lumOff val="0"/>
+            <a:alphaOff val="0"/>
+          </a:schemeClr>
+        </a:solidFill>
+        <a:ln>
+          <a:noFill/>
+        </a:ln>
+        <a:effectLst/>
+      </dsp:spPr>
+      <dsp:style>
+        <a:lnRef idx="0">
+          <a:scrgbClr r="0" g="0" b="0"/>
+        </a:lnRef>
+        <a:fillRef idx="1">
+          <a:scrgbClr r="0" g="0" b="0"/>
+        </a:fillRef>
+        <a:effectRef idx="0">
+          <a:scrgbClr r="0" g="0" b="0"/>
+        </a:effectRef>
+        <a:fontRef idx="minor">
+          <a:schemeClr val="lt1"/>
+        </a:fontRef>
+      </dsp:style>
+      <dsp:txBody>
+        <a:bodyPr spcFirstLastPara="0" vert="horz" wrap="square" lIns="0" tIns="0" rIns="0" bIns="0" numCol="1" spcCol="1270" anchor="ctr" anchorCtr="0">
+          <a:noAutofit/>
+        </a:bodyPr>
+        <a:lstStyle/>
+        <a:p>
+          <a:pPr marL="0" lvl="0" indent="0" algn="ctr" defTabSz="666750">
+            <a:lnSpc>
+              <a:spcPct val="90000"/>
+            </a:lnSpc>
+            <a:spcBef>
+              <a:spcPct val="0"/>
+            </a:spcBef>
+            <a:spcAft>
+              <a:spcPct val="35000"/>
+            </a:spcAft>
+            <a:buNone/>
+          </a:pPr>
+          <a:endParaRPr lang="en-US" sz="1500" kern="1200"/>
+        </a:p>
+      </dsp:txBody>
+      <dsp:txXfrm>
+        <a:off x="5532126" y="2171360"/>
+        <a:ext cx="210381" cy="210948"/>
+      </dsp:txXfrm>
+    </dsp:sp>
+    <dsp:sp modelId="{6AA5E70A-B1A7-44D8-8F87-E74594E5F1F5}">
+      <dsp:nvSpPr>
+        <dsp:cNvPr id="0" name=""/>
+        <dsp:cNvSpPr/>
+      </dsp:nvSpPr>
+      <dsp:spPr>
+        <a:xfrm>
+          <a:off x="5957425" y="1851536"/>
+          <a:ext cx="1417662" cy="850597"/>
+        </a:xfrm>
+        <a:prstGeom prst="roundRect">
+          <a:avLst>
+            <a:gd name="adj" fmla="val 10000"/>
+          </a:avLst>
+        </a:prstGeom>
+        <a:solidFill>
+          <a:schemeClr val="accent1">
+            <a:hueOff val="0"/>
+            <a:satOff val="0"/>
+            <a:lumOff val="0"/>
+            <a:alphaOff val="0"/>
+          </a:schemeClr>
+        </a:solidFill>
+        <a:ln w="19050" cap="flat" cmpd="sng" algn="ctr">
+          <a:solidFill>
+            <a:schemeClr val="lt1">
+              <a:hueOff val="0"/>
+              <a:satOff val="0"/>
+              <a:lumOff val="0"/>
+              <a:alphaOff val="0"/>
+            </a:schemeClr>
+          </a:solidFill>
+          <a:prstDash val="solid"/>
+        </a:ln>
+        <a:effectLst/>
+      </dsp:spPr>
+      <dsp:style>
+        <a:lnRef idx="2">
+          <a:scrgbClr r="0" g="0" b="0"/>
+        </a:lnRef>
+        <a:fillRef idx="1">
+          <a:scrgbClr r="0" g="0" b="0"/>
+        </a:fillRef>
+        <a:effectRef idx="0">
+          <a:scrgbClr r="0" g="0" b="0"/>
+        </a:effectRef>
+        <a:fontRef idx="minor">
+          <a:schemeClr val="lt1"/>
+        </a:fontRef>
+      </dsp:style>
+      <dsp:txBody>
+        <a:bodyPr spcFirstLastPara="0" vert="horz" wrap="square" lIns="87630" tIns="87630" rIns="87630" bIns="87630" numCol="1" spcCol="1270" anchor="ctr" anchorCtr="0">
+          <a:noAutofit/>
+        </a:bodyPr>
+        <a:lstStyle/>
+        <a:p>
+          <a:pPr marL="0" lvl="0" indent="0" algn="ctr" defTabSz="1022350">
+            <a:lnSpc>
+              <a:spcPct val="90000"/>
+            </a:lnSpc>
+            <a:spcBef>
+              <a:spcPct val="0"/>
+            </a:spcBef>
+            <a:spcAft>
+              <a:spcPct val="35000"/>
+            </a:spcAft>
+            <a:buNone/>
+          </a:pPr>
+          <a:r>
+            <a:rPr lang="en-US" sz="2300" kern="1200" dirty="0"/>
+            <a:t>SSMS Inserts</a:t>
+          </a:r>
+        </a:p>
+      </dsp:txBody>
+      <dsp:txXfrm>
+        <a:off x="5982338" y="1876449"/>
+        <a:ext cx="1367836" cy="800771"/>
+      </dsp:txXfrm>
+    </dsp:sp>
+  </dsp:spTree>
+</dsp:drawing>
+</file>
+
+<file path=ppt/diagrams/layout1.xml><?xml version="1.0" encoding="utf-8"?>
+<dgm:layoutDef xmlns:dgm="http://schemas.openxmlformats.org/drawingml/2006/diagram" xmlns:a="http://schemas.openxmlformats.org/drawingml/2006/main" uniqueId="urn:microsoft.com/office/officeart/2005/8/layout/process1">
+  <dgm:title val=""/>
+  <dgm:desc val=""/>
+  <dgm:catLst>
+    <dgm:cat type="process" pri="1000"/>
+    <dgm:cat type="convert" pri="15000"/>
+  </dgm:catLst>
+  <dgm:sampData useDef="1">
+    <dgm:dataModel>
+      <dgm:ptLst/>
+      <dgm:bg/>
+      <dgm:whole/>
+    </dgm:dataModel>
+  </dgm:sampData>
+  <dgm:styleData>
+    <dgm:dataModel>
+      <dgm:ptLst>
+        <dgm:pt modelId="0" type="doc"/>
+        <dgm:pt modelId="1"/>
+        <dgm:pt modelId="2"/>
+      </dgm:ptLst>
+      <dgm:cxnLst>
+        <dgm:cxn modelId="3" srcId="0" destId="1" srcOrd="0" destOrd="0"/>
+        <dgm:cxn modelId="4" srcId="0" destId="2" srcOrd="1" destOrd="0"/>
+      </dgm:cxnLst>
+      <dgm:bg/>
+      <dgm:whole/>
+    </dgm:dataModel>
+  </dgm:styleData>
+  <dgm:clrData>
+    <dgm:dataModel>
+      <dgm:ptLst>
+        <dgm:pt modelId="0" type="doc"/>
+        <dgm:pt modelId="1"/>
+        <dgm:pt modelId="2"/>
+        <dgm:pt modelId="3"/>
+        <dgm:pt modelId="4"/>
+      </dgm:ptLst>
+      <dgm:cxnLst>
+        <dgm:cxn modelId="5" srcId="0" destId="1" srcOrd="0" destOrd="0"/>
+        <dgm:cxn modelId="6" srcId="0" destId="2" srcOrd="1" destOrd="0"/>
+        <dgm:cxn modelId="7" srcId="0" destId="3" srcOrd="2" destOrd="0"/>
+        <dgm:cxn modelId="8" srcId="0" destId="4" srcOrd="3" destOrd="0"/>
+      </dgm:cxnLst>
+      <dgm:bg/>
+      <dgm:whole/>
+    </dgm:dataModel>
+  </dgm:clrData>
+  <dgm:layoutNode name="Name0">
+    <dgm:varLst>
+      <dgm:dir/>
+      <dgm:resizeHandles val="exact"/>
+    </dgm:varLst>
+    <dgm:choose name="Name1">
+      <dgm:if name="Name2" func="var" arg="dir" op="equ" val="norm">
+        <dgm:alg type="lin"/>
+      </dgm:if>
+      <dgm:else name="Name3">
+        <dgm:alg type="lin">
+          <dgm:param type="linDir" val="fromR"/>
+        </dgm:alg>
+      </dgm:else>
+    </dgm:choose>
+    <dgm:shape xmlns:r="http://schemas.openxmlformats.org/officeDocument/2006/relationships" r:blip="">
+      <dgm:adjLst/>
+    </dgm:shape>
+    <dgm:presOf/>
+    <dgm:constrLst>
+      <dgm:constr type="w" for="ch" ptType="node" refType="w"/>
+      <dgm:constr type="h" for="ch" ptType="node" op="equ"/>
+      <dgm:constr type="primFontSz" for="ch" ptType="node" op="equ" val="65"/>
+      <dgm:constr type="w" for="ch" ptType="sibTrans" refType="w" refFor="ch" refPtType="node" op="equ" fact="0.4"/>
+      <dgm:constr type="h" for="ch" ptType="sibTrans" op="equ"/>
+      <dgm:constr type="primFontSz" for="des" forName="connectorText" op="equ" val="55"/>
+      <dgm:constr type="primFontSz" for="des" forName="connectorText" refType="primFontSz" refFor="ch" refPtType="node" op="lte" fact="0.8"/>
+    </dgm:constrLst>
+    <dgm:ruleLst/>
+    <dgm:forEach name="nodesForEach" axis="ch" ptType="node">
+      <dgm:layoutNode name="node">
+        <dgm:varLst>
+          <dgm:bulletEnabled val="1"/>
+        </dgm:varLst>
+        <dgm:alg type="tx"/>
+        <dgm:shape xmlns:r="http://schemas.openxmlformats.org/officeDocument/2006/relationships" type="roundRect" r:blip="">
+          <dgm:adjLst>
+            <dgm:adj idx="1" val="0.1"/>
+          </dgm:adjLst>
+        </dgm:shape>
+        <dgm:presOf axis="desOrSelf" ptType="node"/>
+        <dgm:constrLst>
+          <dgm:constr type="h" refType="w" fact="0.6"/>
+          <dgm:constr type="tMarg" refType="primFontSz" fact="0.3"/>
+          <dgm:constr type="bMarg" refType="primFontSz" fact="0.3"/>
+          <dgm:constr type="lMarg" refType="primFontSz" fact="0.3"/>
+          <dgm:constr type="rMarg" refType="primFontSz" fact="0.3"/>
+        </dgm:constrLst>
+        <dgm:ruleLst>
+          <dgm:rule type="primFontSz" val="18" fact="NaN" max="NaN"/>
+          <dgm:rule type="h" val="NaN" fact="1.5" max="NaN"/>
+          <dgm:rule type="primFontSz" val="5" fact="NaN" max="NaN"/>
+          <dgm:rule type="h" val="INF" fact="NaN" max="NaN"/>
+        </dgm:ruleLst>
+      </dgm:layoutNode>
+      <dgm:forEach name="sibTransForEach" axis="followSib" ptType="sibTrans" cnt="1">
+        <dgm:layoutNode name="sibTrans">
+          <dgm:alg type="conn">
+            <dgm:param type="begPts" val="auto"/>
+            <dgm:param type="endPts" val="auto"/>
+          </dgm:alg>
+          <dgm:shape xmlns:r="http://schemas.openxmlformats.org/officeDocument/2006/relationships" type="conn" r:blip="">
+            <dgm:adjLst/>
+          </dgm:shape>
+          <dgm:presOf axis="self"/>
+          <dgm:constrLst>
+            <dgm:constr type="h" refType="w" fact="0.62"/>
+            <dgm:constr type="connDist"/>
+            <dgm:constr type="begPad" refType="connDist" fact="0.25"/>
+            <dgm:constr type="endPad" refType="connDist" fact="0.22"/>
+          </dgm:constrLst>
+          <dgm:ruleLst/>
+          <dgm:layoutNode name="connectorText">
+            <dgm:alg type="tx">
+              <dgm:param type="autoTxRot" val="grav"/>
+            </dgm:alg>
+            <dgm:shape xmlns:r="http://schemas.openxmlformats.org/officeDocument/2006/relationships" type="conn" r:blip="" hideGeom="1">
+              <dgm:adjLst/>
+            </dgm:shape>
+            <dgm:presOf axis="self"/>
+            <dgm:constrLst>
+              <dgm:constr type="lMarg"/>
+              <dgm:constr type="rMarg"/>
+              <dgm:constr type="tMarg"/>
+              <dgm:constr type="bMarg"/>
+            </dgm:constrLst>
+            <dgm:ruleLst>
+              <dgm:rule type="primFontSz" val="5" fact="NaN" max="NaN"/>
+            </dgm:ruleLst>
+          </dgm:layoutNode>
+        </dgm:layoutNode>
+      </dgm:forEach>
+    </dgm:forEach>
+  </dgm:layoutNode>
+</dgm:layoutDef>
+</file>
+
+<file path=ppt/diagrams/quickStyle1.xml><?xml version="1.0" encoding="utf-8"?>
+<dgm:styleDef xmlns:dgm="http://schemas.openxmlformats.org/drawingml/2006/diagram" xmlns:a="http://schemas.openxmlformats.org/drawingml/2006/main" uniqueId="urn:microsoft.com/office/officeart/2005/8/quickstyle/simple1">
+  <dgm:title val=""/>
+  <dgm:desc val=""/>
+  <dgm:catLst>
+    <dgm:cat type="simple" pri="10100"/>
+  </dgm:catLst>
+  <dgm:scene3d>
+    <a:camera prst="orthographicFront"/>
+    <a:lightRig rig="threePt" dir="t"/>
+  </dgm:scene3d>
+  <dgm:styleLbl name="node0">
+    <dgm:scene3d>
+      <a:camera prst="orthographicFront"/>
+      <a:lightRig rig="threePt" dir="t"/>
+    </dgm:scene3d>
+    <dgm:sp3d/>
+    <dgm:txPr/>
+    <dgm:style>
+      <a:lnRef idx="2">
+        <a:scrgbClr r="0" g="0" b="0"/>
+      </a:lnRef>
+      <a:fillRef idx="1">
+        <a:scrgbClr r="0" g="0" b="0"/>
+      </a:fillRef>
+      <a:effectRef idx="0">
+        <a:scrgbClr r="0" g="0" b="0"/>
+      </a:effectRef>
+      <a:fontRef idx="minor">
+        <a:schemeClr val="lt1"/>
+      </a:fontRef>
+    </dgm:style>
+  </dgm:styleLbl>
+  <dgm:styleLbl name="lnNode1">
+    <dgm:scene3d>
+      <a:camera prst="orthographicFront"/>
+      <a:lightRig rig="threePt" dir="t"/>
+    </dgm:scene3d>
+    <dgm:sp3d/>
+    <dgm:txPr/>
+    <dgm:style>
+      <a:lnRef idx="2">
+        <a:scrgbClr r="0" g="0" b="0"/>
+      </a:lnRef>
+      <a:fillRef idx="1">
+        <a:scrgbClr r="0" g="0" b="0"/>
+      </a:fillRef>
+      <a:effectRef idx="0">
+        <a:scrgbClr r="0" g="0" b="0"/>
+      </a:effectRef>
+      <a:fontRef idx="minor">
+        <a:schemeClr val="lt1"/>
+      </a:fontRef>
+    </dgm:style>
+  </dgm:styleLbl>
+  <dgm:styleLbl name="vennNode1">
+    <dgm:scene3d>
+      <a:camera prst="orthographicFront"/>
+      <a:lightRig rig="threePt" dir="t"/>
+    </dgm:scene3d>
+    <dgm:sp3d/>
+    <dgm:txPr/>
+    <dgm:style>
+      <a:lnRef idx="2">
+        <a:scrgbClr r="0" g="0" b="0"/>
+      </a:lnRef>
+      <a:fillRef idx="1">
+        <a:scrgbClr r="0" g="0" b="0"/>
+      </a:fillRef>
+      <a:effectRef idx="0">
+        <a:scrgbClr r="0" g="0" b="0"/>
+      </a:effectRef>
+      <a:fontRef idx="minor">
+        <a:schemeClr val="tx1"/>
+      </a:fontRef>
+    </dgm:style>
+  </dgm:styleLbl>
+  <dgm:styleLbl name="alignNode1">
+    <dgm:scene3d>
+      <a:camera prst="orthographicFront"/>
+      <a:lightRig rig="threePt" dir="t"/>
+    </dgm:scene3d>
+    <dgm:sp3d/>
+    <dgm:txPr/>
+    <dgm:style>
+      <a:lnRef idx="2">
+        <a:scrgbClr r="0" g="0" b="0"/>
+      </a:lnRef>
+      <a:fillRef idx="1">
+        <a:scrgbClr r="0" g="0" b="0"/>
+      </a:fillRef>
+      <a:effectRef idx="0">
+        <a:scrgbClr r="0" g="0" b="0"/>
+      </a:effectRef>
+      <a:fontRef idx="minor">
+        <a:schemeClr val="lt1"/>
+      </a:fontRef>
+    </dgm:style>
+  </dgm:styleLbl>
+  <dgm:styleLbl name="node1">
+    <dgm:scene3d>
+      <a:camera prst="orthographicFront"/>
+      <a:lightRig rig="threePt" dir="t"/>
+    </dgm:scene3d>
+    <dgm:sp3d/>
+    <dgm:txPr/>
+    <dgm:style>
+      <a:lnRef idx="2">
+        <a:scrgbClr r="0" g="0" b="0"/>
+      </a:lnRef>
+      <a:fillRef idx="1">
+        <a:scrgbClr r="0" g="0" b="0"/>
+      </a:fillRef>
+      <a:effectRef idx="0">
+        <a:scrgbClr r="0" g="0" b="0"/>
+      </a:effectRef>
+      <a:fontRef idx="minor">
+        <a:schemeClr val="lt1"/>
+      </a:fontRef>
+    </dgm:style>
+  </dgm:styleLbl>
+  <dgm:styleLbl name="node2">
+    <dgm:scene3d>
+      <a:camera prst="orthographicFront"/>
+      <a:lightRig rig="threePt" dir="t"/>
+    </dgm:scene3d>
+    <dgm:sp3d/>
+    <dgm:txPr/>
+    <dgm:style>
+      <a:lnRef idx="2">
+        <a:scrgbClr r="0" g="0" b="0"/>
+      </a:lnRef>
+      <a:fillRef idx="1">
+        <a:scrgbClr r="0" g="0" b="0"/>
+      </a:fillRef>
+      <a:effectRef idx="0">
+        <a:scrgbClr r="0" g="0" b="0"/>
+      </a:effectRef>
+      <a:fontRef idx="minor">
+        <a:schemeClr val="lt1"/>
+      </a:fontRef>
+    </dgm:style>
+  </dgm:styleLbl>
+  <dgm:styleLbl name="node3">
+    <dgm:scene3d>
+      <a:camera prst="orthographicFront"/>
+      <a:lightRig rig="threePt" dir="t"/>
+    </dgm:scene3d>
+    <dgm:sp3d/>
+    <dgm:txPr/>
+    <dgm:style>
+      <a:lnRef idx="2">
+        <a:scrgbClr r="0" g="0" b="0"/>
+      </a:lnRef>
+      <a:fillRef idx="1">
+        <a:scrgbClr r="0" g="0" b="0"/>
+      </a:fillRef>
+      <a:effectRef idx="0">
+        <a:scrgbClr r="0" g="0" b="0"/>
+      </a:effectRef>
+      <a:fontRef idx="minor">
+        <a:schemeClr val="lt1"/>
+      </a:fontRef>
+    </dgm:style>
+  </dgm:styleLbl>
+  <dgm:styleLbl name="node4">
+    <dgm:scene3d>
+      <a:camera prst="orthographicFront"/>
+      <a:lightRig rig="threePt" dir="t"/>
+    </dgm:scene3d>
+    <dgm:sp3d/>
+    <dgm:txPr/>
+    <dgm:style>
+      <a:lnRef idx="2">
+        <a:scrgbClr r="0" g="0" b="0"/>
+      </a:lnRef>
+      <a:fillRef idx="1">
+        <a:scrgbClr r="0" g="0" b="0"/>
+      </a:fillRef>
+      <a:effectRef idx="0">
+        <a:scrgbClr r="0" g="0" b="0"/>
+      </a:effectRef>
+      <a:fontRef idx="minor">
+        <a:schemeClr val="lt1"/>
+      </a:fontRef>
+    </dgm:style>
+  </dgm:styleLbl>
+  <dgm:styleLbl name="fgImgPlace1">
+    <dgm:scene3d>
+      <a:camera prst="orthographicFront"/>
+      <a:lightRig rig="threePt" dir="t"/>
+    </dgm:scene3d>
+    <dgm:sp3d/>
+    <dgm:txPr/>
+    <dgm:style>
+      <a:lnRef idx="2">
+        <a:scrgbClr r="0" g="0" b="0"/>
+      </a:lnRef>
+      <a:fillRef idx="1">
+        <a:scrgbClr r="0" g="0" b="0"/>
+      </a:fillRef>
+      <a:effectRef idx="0">
+        <a:scrgbClr r="0" g="0" b="0"/>
+      </a:effectRef>
+      <a:fontRef idx="minor"/>
+    </dgm:style>
+  </dgm:styleLbl>
+  <dgm:styleLbl name="alignImgPlace1">
+    <dgm:scene3d>
+      <a:camera prst="orthographicFront"/>
+      <a:lightRig rig="threePt" dir="t"/>
+    </dgm:scene3d>
+    <dgm:sp3d/>
+    <dgm:txPr/>
+    <dgm:style>
+      <a:lnRef idx="2">
+        <a:scrgbClr r="0" g="0" b="0"/>
+      </a:lnRef>
+      <a:fillRef idx="1">
+        <a:scrgbClr r="0" g="0" b="0"/>
+      </a:fillRef>
+      <a:effectRef idx="0">
+        <a:scrgbClr r="0" g="0" b="0"/>
+      </a:effectRef>
+      <a:fontRef idx="minor"/>
+    </dgm:style>
+  </dgm:styleLbl>
+  <dgm:styleLbl name="bgImgPlace1">
+    <dgm:scene3d>
+      <a:camera prst="orthographicFront"/>
+      <a:lightRig rig="threePt" dir="t"/>
+    </dgm:scene3d>
+    <dgm:sp3d/>
+    <dgm:txPr/>
+    <dgm:style>
+      <a:lnRef idx="2">
+        <a:scrgbClr r="0" g="0" b="0"/>
+      </a:lnRef>
+      <a:fillRef idx="1">
+        <a:scrgbClr r="0" g="0" b="0"/>
+      </a:fillRef>
+      <a:effectRef idx="0">
+        <a:scrgbClr r="0" g="0" b="0"/>
+      </a:effectRef>
+      <a:fontRef idx="minor"/>
+    </dgm:style>
+  </dgm:styleLbl>
+  <dgm:styleLbl name="sibTrans2D1">
+    <dgm:scene3d>
+      <a:camera prst="orthographicFront"/>
+      <a:lightRig rig="threePt" dir="t"/>
+    </dgm:scene3d>
+    <dgm:sp3d/>
+    <dgm:txPr/>
+    <dgm:style>
+      <a:lnRef idx="0">
+        <a:scrgbClr r="0" g="0" b="0"/>
+      </a:lnRef>
+      <a:fillRef idx="1">
+        <a:scrgbClr r="0" g="0" b="0"/>
+      </a:fillRef>
+      <a:effectRef idx="0">
+        <a:scrgbClr r="0" g="0" b="0"/>
+      </a:effectRef>
+      <a:fontRef idx="minor">
+        <a:schemeClr val="lt1"/>
+      </a:fontRef>
+    </dgm:style>
+  </dgm:styleLbl>
+  <dgm:styleLbl name="fgSibTrans2D1">
+    <dgm:scene3d>
+      <a:camera prst="orthographicFront"/>
+      <a:lightRig rig="threePt" dir="t"/>
+    </dgm:scene3d>
+    <dgm:sp3d/>
+    <dgm:txPr/>
+    <dgm:style>
+      <a:lnRef idx="0">
+        <a:scrgbClr r="0" g="0" b="0"/>
+      </a:lnRef>
+      <a:fillRef idx="1">
+        <a:scrgbClr r="0" g="0" b="0"/>
+      </a:fillRef>
+      <a:effectRef idx="0">
+        <a:scrgbClr r="0" g="0" b="0"/>
+      </a:effectRef>
+      <a:fontRef idx="minor">
+        <a:schemeClr val="lt1"/>
+      </a:fontRef>
+    </dgm:style>
+  </dgm:styleLbl>
+  <dgm:styleLbl name="bgSibTrans2D1">
+    <dgm:scene3d>
+      <a:camera prst="orthographicFront"/>
+      <a:lightRig rig="threePt" dir="t"/>
+    </dgm:scene3d>
+    <dgm:sp3d/>
+    <dgm:txPr/>
+    <dgm:style>
+      <a:lnRef idx="0">
+        <a:scrgbClr r="0" g="0" b="0"/>
+      </a:lnRef>
+      <a:fillRef idx="1">
+        <a:scrgbClr r="0" g="0" b="0"/>
+      </a:fillRef>
+      <a:effectRef idx="0">
+        <a:scrgbClr r="0" g="0" b="0"/>
+      </a:effectRef>
+      <a:fontRef idx="minor">
+        <a:schemeClr val="lt1"/>
+      </a:fontRef>
+    </dgm:style>
+  </dgm:styleLbl>
+  <dgm:styleLbl name="sibTrans1D1">
+    <dgm:scene3d>
+      <a:camera prst="orthographicFront"/>
+      <a:lightRig rig="threePt" dir="t"/>
+    </dgm:scene3d>
+    <dgm:sp3d/>
+    <dgm:txPr/>
+    <dgm:style>
+      <a:lnRef idx="1">
+        <a:scrgbClr r="0" g="0" b="0"/>
+      </a:lnRef>
+      <a:fillRef idx="0">
+        <a:scrgbClr r="0" g="0" b="0"/>
+      </a:fillRef>
+      <a:effectRef idx="0">
+        <a:scrgbClr r="0" g="0" b="0"/>
+      </a:effectRef>
+      <a:fontRef idx="minor"/>
+    </dgm:style>
+  </dgm:styleLbl>
+  <dgm:styleLbl name="callout">
+    <dgm:scene3d>
+      <a:camera prst="orthographicFront"/>
+      <a:lightRig rig="threePt" dir="t"/>
+    </dgm:scene3d>
+    <dgm:sp3d/>
+    <dgm:txPr/>
+    <dgm:style>
+      <a:lnRef idx="2">
+        <a:scrgbClr r="0" g="0" b="0"/>
+      </a:lnRef>
+      <a:fillRef idx="1">
+        <a:scrgbClr r="0" g="0" b="0"/>
+      </a:fillRef>
+      <a:effectRef idx="0">
+        <a:scrgbClr r="0" g="0" b="0"/>
+      </a:effectRef>
+      <a:fontRef idx="minor"/>
+    </dgm:style>
+  </dgm:styleLbl>
+  <dgm:styleLbl name="asst0">
+    <dgm:scene3d>
+      <a:camera prst="orthographicFront"/>
+      <a:lightRig rig="threePt" dir="t"/>
+    </dgm:scene3d>
+    <dgm:sp3d/>
+    <dgm:txPr/>
+    <dgm:style>
+      <a:lnRef idx="2">
+        <a:scrgbClr r="0" g="0" b="0"/>
+      </a:lnRef>
+      <a:fillRef idx="1">
+        <a:scrgbClr r="0" g="0" b="0"/>
+      </a:fillRef>
+      <a:effectRef idx="0">
+        <a:scrgbClr r="0" g="0" b="0"/>
+      </a:effectRef>
+      <a:fontRef idx="minor">
+        <a:schemeClr val="lt1"/>
+      </a:fontRef>
+    </dgm:style>
+  </dgm:styleLbl>
+  <dgm:styleLbl name="asst1">
+    <dgm:scene3d>
+      <a:camera prst="orthographicFront"/>
+      <a:lightRig rig="threePt" dir="t"/>
+    </dgm:scene3d>
+    <dgm:sp3d/>
+    <dgm:txPr/>
+    <dgm:style>
+      <a:lnRef idx="2">
+        <a:scrgbClr r="0" g="0" b="0"/>
+      </a:lnRef>
+      <a:fillRef idx="1">
+        <a:scrgbClr r="0" g="0" b="0"/>
+      </a:fillRef>
+      <a:effectRef idx="0">
+        <a:scrgbClr r="0" g="0" b="0"/>
+      </a:effectRef>
+      <a:fontRef idx="minor">
+        <a:schemeClr val="lt1"/>
+      </a:fontRef>
+    </dgm:style>
+  </dgm:styleLbl>
+  <dgm:styleLbl name="asst2">
+    <dgm:scene3d>
+      <a:camera prst="orthographicFront"/>
+      <a:lightRig rig="threePt" dir="t"/>
+    </dgm:scene3d>
+    <dgm:sp3d/>
+    <dgm:txPr/>
+    <dgm:style>
+      <a:lnRef idx="2">
+        <a:scrgbClr r="0" g="0" b="0"/>
+      </a:lnRef>
+      <a:fillRef idx="1">
+        <a:scrgbClr r="0" g="0" b="0"/>
+      </a:fillRef>
+      <a:effectRef idx="0">
+        <a:scrgbClr r="0" g="0" b="0"/>
+      </a:effectRef>
+      <a:fontRef idx="minor">
+        <a:schemeClr val="lt1"/>
+      </a:fontRef>
+    </dgm:style>
+  </dgm:styleLbl>
+  <dgm:styleLbl name="asst3">
+    <dgm:scene3d>
+      <a:camera prst="orthographicFront"/>
+      <a:lightRig rig="threePt" dir="t"/>
+    </dgm:scene3d>
+    <dgm:sp3d/>
+    <dgm:txPr/>
+    <dgm:style>
+      <a:lnRef idx="2">
+        <a:scrgbClr r="0" g="0" b="0"/>
+      </a:lnRef>
+      <a:fillRef idx="1">
+        <a:scrgbClr r="0" g="0" b="0"/>
+      </a:fillRef>
+      <a:effectRef idx="0">
+        <a:scrgbClr r="0" g="0" b="0"/>
+      </a:effectRef>
+      <a:fontRef idx="minor">
+        <a:schemeClr val="lt1"/>
+      </a:fontRef>
+    </dgm:style>
+  </dgm:styleLbl>
+  <dgm:styleLbl name="asst4">
+    <dgm:scene3d>
+      <a:camera prst="orthographicFront"/>
+      <a:lightRig rig="threePt" dir="t"/>
+    </dgm:scene3d>
+    <dgm:sp3d/>
+    <dgm:txPr/>
+    <dgm:style>
+      <a:lnRef idx="2">
+        <a:scrgbClr r="0" g="0" b="0"/>
+      </a:lnRef>
+      <a:fillRef idx="1">
+        <a:scrgbClr r="0" g="0" b="0"/>
+      </a:fillRef>
+      <a:effectRef idx="0">
+        <a:scrgbClr r="0" g="0" b="0"/>
+      </a:effectRef>
+      <a:fontRef idx="minor">
+        <a:schemeClr val="lt1"/>
+      </a:fontRef>
+    </dgm:style>
+  </dgm:styleLbl>
+  <dgm:styleLbl name="parChTrans2D1">
+    <dgm:scene3d>
+      <a:camera prst="orthographicFront"/>
+      <a:lightRig rig="threePt" dir="t"/>
+    </dgm:scene3d>
+    <dgm:sp3d/>
+    <dgm:txPr/>
+    <dgm:style>
+      <a:lnRef idx="2">
+        <a:scrgbClr r="0" g="0" b="0"/>
+      </a:lnRef>
+      <a:fillRef idx="1">
+        <a:scrgbClr r="0" g="0" b="0"/>
+      </a:fillRef>
+      <a:effectRef idx="0">
+        <a:scrgbClr r="0" g="0" b="0"/>
+      </a:effectRef>
+      <a:fontRef idx="minor">
+        <a:schemeClr val="lt1"/>
+      </a:fontRef>
+    </dgm:style>
+  </dgm:styleLbl>
+  <dgm:styleLbl name="parChTrans2D2">
+    <dgm:scene3d>
+      <a:camera prst="orthographicFront"/>
+      <a:lightRig rig="threePt" dir="t"/>
+    </dgm:scene3d>
+    <dgm:sp3d/>
+    <dgm:txPr/>
+    <dgm:style>
+      <a:lnRef idx="2">
+        <a:scrgbClr r="0" g="0" b="0"/>
+      </a:lnRef>
+      <a:fillRef idx="1">
+        <a:scrgbClr r="0" g="0" b="0"/>
+      </a:fillRef>
+      <a:effectRef idx="0">
+        <a:scrgbClr r="0" g="0" b="0"/>
+      </a:effectRef>
+      <a:fontRef idx="minor">
+        <a:schemeClr val="lt1"/>
+      </a:fontRef>
+    </dgm:style>
+  </dgm:styleLbl>
+  <dgm:styleLbl name="parChTrans2D3">
+    <dgm:scene3d>
+      <a:camera prst="orthographicFront"/>
+      <a:lightRig rig="threePt" dir="t"/>
+    </dgm:scene3d>
+    <dgm:sp3d/>
+    <dgm:txPr/>
+    <dgm:style>
+      <a:lnRef idx="2">
+        <a:scrgbClr r="0" g="0" b="0"/>
+      </a:lnRef>
+      <a:fillRef idx="1">
+        <a:scrgbClr r="0" g="0" b="0"/>
+      </a:fillRef>
+      <a:effectRef idx="0">
+        <a:scrgbClr r="0" g="0" b="0"/>
+      </a:effectRef>
+      <a:fontRef idx="minor">
+        <a:schemeClr val="lt1"/>
+      </a:fontRef>
+    </dgm:style>
+  </dgm:styleLbl>
+  <dgm:styleLbl name="parChTrans2D4">
+    <dgm:scene3d>
+      <a:camera prst="orthographicFront"/>
+      <a:lightRig rig="threePt" dir="t"/>
+    </dgm:scene3d>
+    <dgm:sp3d/>
+    <dgm:txPr/>
+    <dgm:style>
+      <a:lnRef idx="2">
+        <a:scrgbClr r="0" g="0" b="0"/>
+      </a:lnRef>
+      <a:fillRef idx="1">
+        <a:scrgbClr r="0" g="0" b="0"/>
+      </a:fillRef>
+      <a:effectRef idx="0">
+        <a:scrgbClr r="0" g="0" b="0"/>
+      </a:effectRef>
+      <a:fontRef idx="minor">
+        <a:schemeClr val="lt1"/>
+      </a:fontRef>
+    </dgm:style>
+  </dgm:styleLbl>
+  <dgm:styleLbl name="parChTrans1D1">
+    <dgm:scene3d>
+      <a:camera prst="orthographicFront"/>
+      <a:lightRig rig="threePt" dir="t"/>
+    </dgm:scene3d>
+    <dgm:sp3d/>
+    <dgm:txPr/>
+    <dgm:style>
+      <a:lnRef idx="2">
+        <a:scrgbClr r="0" g="0" b="0"/>
+      </a:lnRef>
+      <a:fillRef idx="0">
+        <a:scrgbClr r="0" g="0" b="0"/>
+      </a:fillRef>
+      <a:effectRef idx="0">
+        <a:scrgbClr r="0" g="0" b="0"/>
+      </a:effectRef>
+      <a:fontRef idx="minor"/>
+    </dgm:style>
+  </dgm:styleLbl>
+  <dgm:styleLbl name="parChTrans1D2">
+    <dgm:scene3d>
+      <a:camera prst="orthographicFront"/>
+      <a:lightRig rig="threePt" dir="t"/>
+    </dgm:scene3d>
+    <dgm:sp3d/>
+    <dgm:txPr/>
+    <dgm:style>
+      <a:lnRef idx="2">
+        <a:scrgbClr r="0" g="0" b="0"/>
+      </a:lnRef>
+      <a:fillRef idx="0">
+        <a:scrgbClr r="0" g="0" b="0"/>
+      </a:fillRef>
+      <a:effectRef idx="0">
+        <a:scrgbClr r="0" g="0" b="0"/>
+      </a:effectRef>
+      <a:fontRef idx="minor"/>
+    </dgm:style>
+  </dgm:styleLbl>
+  <dgm:styleLbl name="parChTrans1D3">
+    <dgm:scene3d>
+      <a:camera prst="orthographicFront"/>
+      <a:lightRig rig="threePt" dir="t"/>
+    </dgm:scene3d>
+    <dgm:sp3d/>
+    <dgm:txPr/>
+    <dgm:style>
+      <a:lnRef idx="2">
+        <a:scrgbClr r="0" g="0" b="0"/>
+      </a:lnRef>
+      <a:fillRef idx="0">
+        <a:scrgbClr r="0" g="0" b="0"/>
+      </a:fillRef>
+      <a:effectRef idx="0">
+        <a:scrgbClr r="0" g="0" b="0"/>
+      </a:effectRef>
+      <a:fontRef idx="minor"/>
+    </dgm:style>
+  </dgm:styleLbl>
+  <dgm:styleLbl name="parChTrans1D4">
+    <dgm:scene3d>
+      <a:camera prst="orthographicFront"/>
+      <a:lightRig rig="threePt" dir="t"/>
+    </dgm:scene3d>
+    <dgm:sp3d/>
+    <dgm:txPr/>
+    <dgm:style>
+      <a:lnRef idx="2">
+        <a:scrgbClr r="0" g="0" b="0"/>
+      </a:lnRef>
+      <a:fillRef idx="0">
+        <a:scrgbClr r="0" g="0" b="0"/>
+      </a:fillRef>
+      <a:effectRef idx="0">
+        <a:scrgbClr r="0" g="0" b="0"/>
+      </a:effectRef>
+      <a:fontRef idx="minor"/>
+    </dgm:style>
+  </dgm:styleLbl>
+  <dgm:styleLbl name="fgAcc1">
+    <dgm:scene3d>
+      <a:camera prst="orthographicFront"/>
+      <a:lightRig rig="threePt" dir="t"/>
+    </dgm:scene3d>
+    <dgm:sp3d/>
+    <dgm:txPr/>
+    <dgm:style>
+      <a:lnRef idx="2">
+        <a:scrgbClr r="0" g="0" b="0"/>
+      </a:lnRef>
+      <a:fillRef idx="1">
+        <a:scrgbClr r="0" g="0" b="0"/>
+      </a:fillRef>
+      <a:effectRef idx="0">
+        <a:scrgbClr r="0" g="0" b="0"/>
+      </a:effectRef>
+      <a:fontRef idx="minor"/>
+    </dgm:style>
+  </dgm:styleLbl>
+  <dgm:styleLbl name="conFgAcc1">
+    <dgm:scene3d>
+      <a:camera prst="orthographicFront"/>
+      <a:lightRig rig="threePt" dir="t"/>
+    </dgm:scene3d>
+    <dgm:sp3d/>
+    <dgm:txPr/>
+    <dgm:style>
+      <a:lnRef idx="2">
+        <a:scrgbClr r="0" g="0" b="0"/>
+      </a:lnRef>
+      <a:fillRef idx="1">
+        <a:scrgbClr r="0" g="0" b="0"/>
+      </a:fillRef>
+      <a:effectRef idx="0">
+        <a:scrgbClr r="0" g="0" b="0"/>
+      </a:effectRef>
+      <a:fontRef idx="minor"/>
+    </dgm:style>
+  </dgm:styleLbl>
+  <dgm:styleLbl name="alignAcc1">
+    <dgm:scene3d>
+      <a:camera prst="orthographicFront"/>
+      <a:lightRig rig="threePt" dir="t"/>
+    </dgm:scene3d>
+    <dgm:sp3d/>
+    <dgm:txPr/>
+    <dgm:style>
+      <a:lnRef idx="2">
+        <a:scrgbClr r="0" g="0" b="0"/>
+      </a:lnRef>
+      <a:fillRef idx="1">
+        <a:scrgbClr r="0" g="0" b="0"/>
+      </a:fillRef>
+      <a:effectRef idx="0">
+        <a:scrgbClr r="0" g="0" b="0"/>
+      </a:effectRef>
+      <a:fontRef idx="minor"/>
+    </dgm:style>
+  </dgm:styleLbl>
+  <dgm:styleLbl name="trAlignAcc1">
+    <dgm:scene3d>
+      <a:camera prst="orthographicFront"/>
+      <a:lightRig rig="threePt" dir="t"/>
+    </dgm:scene3d>
+    <dgm:sp3d/>
+    <dgm:txPr/>
+    <dgm:style>
+      <a:lnRef idx="1">
+        <a:scrgbClr r="0" g="0" b="0"/>
+      </a:lnRef>
+      <a:fillRef idx="1">
+        <a:scrgbClr r="0" g="0" b="0"/>
+      </a:fillRef>
+      <a:effectRef idx="0">
+        <a:scrgbClr r="0" g="0" b="0"/>
+      </a:effectRef>
+      <a:fontRef idx="minor"/>
+    </dgm:style>
+  </dgm:styleLbl>
+  <dgm:styleLbl name="bgAcc1">
+    <dgm:scene3d>
+      <a:camera prst="orthographicFront"/>
+      <a:lightRig rig="threePt" dir="t"/>
+    </dgm:scene3d>
+    <dgm:sp3d/>
+    <dgm:txPr/>
+    <dgm:style>
+      <a:lnRef idx="2">
+        <a:scrgbClr r="0" g="0" b="0"/>
+      </a:lnRef>
+      <a:fillRef idx="1">
+        <a:scrgbClr r="0" g="0" b="0"/>
+      </a:fillRef>
+      <a:effectRef idx="0">
+        <a:scrgbClr r="0" g="0" b="0"/>
+      </a:effectRef>
+      <a:fontRef idx="minor"/>
+    </dgm:style>
+  </dgm:styleLbl>
+  <dgm:styleLbl name="solidFgAcc1">
+    <dgm:scene3d>
+      <a:camera prst="orthographicFront"/>
+      <a:lightRig rig="threePt" dir="t"/>
+    </dgm:scene3d>
+    <dgm:sp3d/>
+    <dgm:txPr/>
+    <dgm:style>
+      <a:lnRef idx="2">
+        <a:scrgbClr r="0" g="0" b="0"/>
+      </a:lnRef>
+      <a:fillRef idx="1">
+        <a:scrgbClr r="0" g="0" b="0"/>
+      </a:fillRef>
+      <a:effectRef idx="0">
+        <a:scrgbClr r="0" g="0" b="0"/>
+      </a:effectRef>
+      <a:fontRef idx="minor"/>
+    </dgm:style>
+  </dgm:styleLbl>
+  <dgm:styleLbl name="solidAlignAcc1">
+    <dgm:scene3d>
+      <a:camera prst="orthographicFront"/>
+      <a:lightRig rig="threePt" dir="t"/>
+    </dgm:scene3d>
+    <dgm:sp3d/>
+    <dgm:txPr/>
+    <dgm:style>
+      <a:lnRef idx="2">
+        <a:scrgbClr r="0" g="0" b="0"/>
+      </a:lnRef>
+      <a:fillRef idx="1">
+        <a:scrgbClr r="0" g="0" b="0"/>
+      </a:fillRef>
+      <a:effectRef idx="0">
+        <a:scrgbClr r="0" g="0" b="0"/>
+      </a:effectRef>
+      <a:fontRef idx="minor"/>
+    </dgm:style>
+  </dgm:styleLbl>
+  <dgm:styleLbl name="solidBgAcc1">
+    <dgm:scene3d>
+      <a:camera prst="orthographicFront"/>
+      <a:lightRig rig="threePt" dir="t"/>
+    </dgm:scene3d>
+    <dgm:sp3d/>
+    <dgm:txPr/>
+    <dgm:style>
+      <a:lnRef idx="2">
+        <a:scrgbClr r="0" g="0" b="0"/>
+      </a:lnRef>
+      <a:fillRef idx="1">
+        <a:scrgbClr r="0" g="0" b="0"/>
+      </a:fillRef>
+      <a:effectRef idx="0">
+        <a:scrgbClr r="0" g="0" b="0"/>
+      </a:effectRef>
+      <a:fontRef idx="minor"/>
+    </dgm:style>
+  </dgm:styleLbl>
+  <dgm:styleLbl name="fgAccFollowNode1">
+    <dgm:scene3d>
+      <a:camera prst="orthographicFront"/>
+      <a:lightRig rig="threePt" dir="t"/>
+    </dgm:scene3d>
+    <dgm:sp3d/>
+    <dgm:txPr/>
+    <dgm:style>
+      <a:lnRef idx="2">
+        <a:scrgbClr r="0" g="0" b="0"/>
+      </a:lnRef>
+      <a:fillRef idx="1">
+        <a:scrgbClr r="0" g="0" b="0"/>
+      </a:fillRef>
+      <a:effectRef idx="0">
+        <a:scrgbClr r="0" g="0" b="0"/>
+      </a:effectRef>
+      <a:fontRef idx="minor"/>
+    </dgm:style>
+  </dgm:styleLbl>
+  <dgm:styleLbl name="alignAccFollowNode1">
+    <dgm:scene3d>
+      <a:camera prst="orthographicFront"/>
+      <a:lightRig rig="threePt" dir="t"/>
+    </dgm:scene3d>
+    <dgm:sp3d/>
+    <dgm:txPr/>
+    <dgm:style>
+      <a:lnRef idx="2">
+        <a:scrgbClr r="0" g="0" b="0"/>
+      </a:lnRef>
+      <a:fillRef idx="1">
+        <a:scrgbClr r="0" g="0" b="0"/>
+      </a:fillRef>
+      <a:effectRef idx="0">
+        <a:scrgbClr r="0" g="0" b="0"/>
+      </a:effectRef>
+      <a:fontRef idx="minor"/>
+    </dgm:style>
+  </dgm:styleLbl>
+  <dgm:styleLbl name="bgAccFollowNode1">
+    <dgm:scene3d>
+      <a:camera prst="orthographicFront"/>
+      <a:lightRig rig="threePt" dir="t"/>
+    </dgm:scene3d>
+    <dgm:sp3d/>
+    <dgm:txPr/>
+    <dgm:style>
+      <a:lnRef idx="2">
+        <a:scrgbClr r="0" g="0" b="0"/>
+      </a:lnRef>
+      <a:fillRef idx="1">
+        <a:scrgbClr r="0" g="0" b="0"/>
+      </a:fillRef>
+      <a:effectRef idx="0">
+        <a:scrgbClr r="0" g="0" b="0"/>
+      </a:effectRef>
+      <a:fontRef idx="minor"/>
+    </dgm:style>
+  </dgm:styleLbl>
+  <dgm:styleLbl name="fgAcc0">
+    <dgm:scene3d>
+      <a:camera prst="orthographicFront"/>
+      <a:lightRig rig="threePt" dir="t"/>
+    </dgm:scene3d>
+    <dgm:sp3d/>
+    <dgm:txPr/>
+    <dgm:style>
+      <a:lnRef idx="2">
+        <a:scrgbClr r="0" g="0" b="0"/>
+      </a:lnRef>
+      <a:fillRef idx="1">
+        <a:scrgbClr r="0" g="0" b="0"/>
+      </a:fillRef>
+      <a:effectRef idx="0">
+        <a:scrgbClr r="0" g="0" b="0"/>
+      </a:effectRef>
+      <a:fontRef idx="minor"/>
+    </dgm:style>
+  </dgm:styleLbl>
+  <dgm:styleLbl name="fgAcc2">
+    <dgm:scene3d>
+      <a:camera prst="orthographicFront"/>
+      <a:lightRig rig="threePt" dir="t"/>
+    </dgm:scene3d>
+    <dgm:sp3d/>
+    <dgm:txPr/>
+    <dgm:style>
+      <a:lnRef idx="2">
+        <a:scrgbClr r="0" g="0" b="0"/>
+      </a:lnRef>
+      <a:fillRef idx="1">
+        <a:scrgbClr r="0" g="0" b="0"/>
+      </a:fillRef>
+      <a:effectRef idx="0">
+        <a:scrgbClr r="0" g="0" b="0"/>
+      </a:effectRef>
+      <a:fontRef idx="minor"/>
+    </dgm:style>
+  </dgm:styleLbl>
+  <dgm:styleLbl name="fgAcc3">
+    <dgm:scene3d>
+      <a:camera prst="orthographicFront"/>
+      <a:lightRig rig="threePt" dir="t"/>
+    </dgm:scene3d>
+    <dgm:sp3d/>
+    <dgm:txPr/>
+    <dgm:style>
+      <a:lnRef idx="2">
+        <a:scrgbClr r="0" g="0" b="0"/>
+      </a:lnRef>
+      <a:fillRef idx="1">
+        <a:scrgbClr r="0" g="0" b="0"/>
+      </a:fillRef>
+      <a:effectRef idx="0">
+        <a:scrgbClr r="0" g="0" b="0"/>
+      </a:effectRef>
+      <a:fontRef idx="minor"/>
+    </dgm:style>
+  </dgm:styleLbl>
+  <dgm:styleLbl name="fgAcc4">
+    <dgm:scene3d>
+      <a:camera prst="orthographicFront"/>
+      <a:lightRig rig="threePt" dir="t"/>
+    </dgm:scene3d>
+    <dgm:sp3d/>
+    <dgm:txPr/>
+    <dgm:style>
+      <a:lnRef idx="2">
+        <a:scrgbClr r="0" g="0" b="0"/>
+      </a:lnRef>
+      <a:fillRef idx="1">
+        <a:scrgbClr r="0" g="0" b="0"/>
+      </a:fillRef>
+      <a:effectRef idx="0">
+        <a:scrgbClr r="0" g="0" b="0"/>
+      </a:effectRef>
+      <a:fontRef idx="minor"/>
+    </dgm:style>
+  </dgm:styleLbl>
+  <dgm:styleLbl name="bgShp">
+    <dgm:scene3d>
+      <a:camera prst="orthographicFront"/>
+      <a:lightRig rig="threePt" dir="t"/>
+    </dgm:scene3d>
+    <dgm:sp3d/>
+    <dgm:txPr/>
+    <dgm:style>
+      <a:lnRef idx="0">
+        <a:scrgbClr r="0" g="0" b="0"/>
+      </a:lnRef>
+      <a:fillRef idx="1">
+        <a:scrgbClr r="0" g="0" b="0"/>
+      </a:fillRef>
+      <a:effectRef idx="0">
+        <a:scrgbClr r="0" g="0" b="0"/>
+      </a:effectRef>
+      <a:fontRef idx="minor"/>
+    </dgm:style>
+  </dgm:styleLbl>
+  <dgm:styleLbl name="dkBgShp">
+    <dgm:scene3d>
+      <a:camera prst="orthographicFront"/>
+      <a:lightRig rig="threePt" dir="t"/>
+    </dgm:scene3d>
+    <dgm:sp3d/>
+    <dgm:txPr/>
+    <dgm:style>
+      <a:lnRef idx="0">
+        <a:scrgbClr r="0" g="0" b="0"/>
+      </a:lnRef>
+      <a:fillRef idx="1">
+        <a:scrgbClr r="0" g="0" b="0"/>
+      </a:fillRef>
+      <a:effectRef idx="0">
+        <a:scrgbClr r="0" g="0" b="0"/>
+      </a:effectRef>
+      <a:fontRef idx="minor"/>
+    </dgm:style>
+  </dgm:styleLbl>
+  <dgm:styleLbl name="trBgShp">
+    <dgm:scene3d>
+      <a:camera prst="orthographicFront"/>
+      <a:lightRig rig="threePt" dir="t"/>
+    </dgm:scene3d>
+    <dgm:sp3d/>
+    <dgm:txPr/>
+    <dgm:style>
+      <a:lnRef idx="0">
+        <a:scrgbClr r="0" g="0" b="0"/>
+      </a:lnRef>
+      <a:fillRef idx="1">
+        <a:scrgbClr r="0" g="0" b="0"/>
+      </a:fillRef>
+      <a:effectRef idx="0">
+        <a:scrgbClr r="0" g="0" b="0"/>
+      </a:effectRef>
+      <a:fontRef idx="minor"/>
+    </dgm:style>
+  </dgm:styleLbl>
+  <dgm:styleLbl name="fgShp">
+    <dgm:scene3d>
+      <a:camera prst="orthographicFront"/>
+      <a:lightRig rig="threePt" dir="t"/>
+    </dgm:scene3d>
+    <dgm:sp3d/>
+    <dgm:txPr/>
+    <dgm:style>
+      <a:lnRef idx="2">
+        <a:scrgbClr r="0" g="0" b="0"/>
+      </a:lnRef>
+      <a:fillRef idx="1">
+        <a:scrgbClr r="0" g="0" b="0"/>
+      </a:fillRef>
+      <a:effectRef idx="0">
+        <a:scrgbClr r="0" g="0" b="0"/>
+      </a:effectRef>
+      <a:fontRef idx="minor"/>
+    </dgm:style>
+  </dgm:styleLbl>
+  <dgm:styleLbl name="revTx">
+    <dgm:scene3d>
+      <a:camera prst="orthographicFront"/>
+      <a:lightRig rig="threePt" dir="t"/>
+    </dgm:scene3d>
+    <dgm:sp3d/>
+    <dgm:txPr/>
+    <dgm:style>
+      <a:lnRef idx="0">
+        <a:scrgbClr r="0" g="0" b="0"/>
+      </a:lnRef>
+      <a:fillRef idx="0">
+        <a:scrgbClr r="0" g="0" b="0"/>
+      </a:fillRef>
+      <a:effectRef idx="0">
+        <a:scrgbClr r="0" g="0" b="0"/>
+      </a:effectRef>
+      <a:fontRef idx="minor"/>
+    </dgm:style>
+  </dgm:styleLbl>
+</dgm:styleDef>
 </file>
 
 <file path=ppt/slideLayouts/slideLayout1.xml><?xml version="1.0" encoding="utf-8"?>
@@ -5610,6 +8336,260 @@
 </p:sld>
 </file>
 
+<file path=ppt/slides/slide2.xml><?xml version="1.0" encoding="utf-8"?>
+<p:sld xmlns:a="http://schemas.openxmlformats.org/drawingml/2006/main" xmlns:r="http://schemas.openxmlformats.org/officeDocument/2006/relationships" xmlns:p="http://schemas.openxmlformats.org/presentationml/2006/main">
+  <p:cSld>
+    <p:spTree>
+      <p:nvGrpSpPr>
+        <p:cNvPr id="1" name=""/>
+        <p:cNvGrpSpPr/>
+        <p:nvPr/>
+      </p:nvGrpSpPr>
+      <p:grpSpPr>
+        <a:xfrm>
+          <a:off x="0" y="0"/>
+          <a:ext cx="0" cy="0"/>
+          <a:chOff x="0" y="0"/>
+          <a:chExt cx="0" cy="0"/>
+        </a:xfrm>
+      </p:grpSpPr>
+      <p:sp>
+        <p:nvSpPr>
+          <p:cNvPr id="2" name="Title 1">
+            <a:extLst>
+              <a:ext uri="{FF2B5EF4-FFF2-40B4-BE49-F238E27FC236}">
+                <a16:creationId xmlns:a16="http://schemas.microsoft.com/office/drawing/2014/main" id="{86E81D24-FD7A-4AAB-9538-F7EA14A9BC61}"/>
+              </a:ext>
+            </a:extLst>
+          </p:cNvPr>
+          <p:cNvSpPr>
+            <a:spLocks noGrp="1"/>
+          </p:cNvSpPr>
+          <p:nvPr>
+            <p:ph type="title"/>
+          </p:nvPr>
+        </p:nvSpPr>
+        <p:spPr>
+          <a:xfrm>
+            <a:off x="366944" y="591845"/>
+            <a:ext cx="4439440" cy="1326321"/>
+          </a:xfrm>
+        </p:spPr>
+        <p:txBody>
+          <a:bodyPr>
+            <a:normAutofit fontScale="90000"/>
+          </a:bodyPr>
+          <a:lstStyle/>
+          <a:p>
+            <a:r>
+              <a:rPr lang="en-US" dirty="0"/>
+              <a:t>ENTITY RELATIONSHIP DIAGRAM (ERD)</a:t>
+            </a:r>
+          </a:p>
+        </p:txBody>
+      </p:sp>
+      <p:pic>
+        <p:nvPicPr>
+          <p:cNvPr id="5" name="Content Placeholder 4">
+            <a:extLst>
+              <a:ext uri="{FF2B5EF4-FFF2-40B4-BE49-F238E27FC236}">
+                <a16:creationId xmlns:a16="http://schemas.microsoft.com/office/drawing/2014/main" id="{17454D9B-ABC9-4425-B407-A2F080B1B6D1}"/>
+              </a:ext>
+            </a:extLst>
+          </p:cNvPr>
+          <p:cNvPicPr>
+            <a:picLocks noGrp="1" noChangeAspect="1"/>
+          </p:cNvPicPr>
+          <p:nvPr>
+            <p:ph idx="1"/>
+          </p:nvPr>
+        </p:nvPicPr>
+        <p:blipFill>
+          <a:blip r:embed="rId2"/>
+          <a:stretch>
+            <a:fillRect/>
+          </a:stretch>
+        </p:blipFill>
+        <p:spPr>
+          <a:xfrm>
+            <a:off x="4996809" y="526186"/>
+            <a:ext cx="6757226" cy="5805627"/>
+          </a:xfrm>
+        </p:spPr>
+      </p:pic>
+    </p:spTree>
+    <p:extLst>
+      <p:ext uri="{BB962C8B-B14F-4D97-AF65-F5344CB8AC3E}">
+        <p14:creationId xmlns:p14="http://schemas.microsoft.com/office/powerpoint/2010/main" val="4110323775"/>
+      </p:ext>
+    </p:extLst>
+  </p:cSld>
+  <p:clrMapOvr>
+    <a:masterClrMapping/>
+  </p:clrMapOvr>
+</p:sld>
+</file>
+
+<file path=ppt/slides/slide3.xml><?xml version="1.0" encoding="utf-8"?>
+<p:sld xmlns:a="http://schemas.openxmlformats.org/drawingml/2006/main" xmlns:r="http://schemas.openxmlformats.org/officeDocument/2006/relationships" xmlns:p="http://schemas.openxmlformats.org/presentationml/2006/main">
+  <p:cSld>
+    <p:spTree>
+      <p:nvGrpSpPr>
+        <p:cNvPr id="1" name=""/>
+        <p:cNvGrpSpPr/>
+        <p:nvPr/>
+      </p:nvGrpSpPr>
+      <p:grpSpPr>
+        <a:xfrm>
+          <a:off x="0" y="0"/>
+          <a:ext cx="0" cy="0"/>
+          <a:chOff x="0" y="0"/>
+          <a:chExt cx="0" cy="0"/>
+        </a:xfrm>
+      </p:grpSpPr>
+      <p:sp>
+        <p:nvSpPr>
+          <p:cNvPr id="2" name="Title 1">
+            <a:extLst>
+              <a:ext uri="{FF2B5EF4-FFF2-40B4-BE49-F238E27FC236}">
+                <a16:creationId xmlns:a16="http://schemas.microsoft.com/office/drawing/2014/main" id="{9923943E-AFAD-4265-81C9-5A185EB59BDB}"/>
+              </a:ext>
+            </a:extLst>
+          </p:cNvPr>
+          <p:cNvSpPr>
+            <a:spLocks noGrp="1"/>
+          </p:cNvSpPr>
+          <p:nvPr>
+            <p:ph type="title"/>
+          </p:nvPr>
+        </p:nvSpPr>
+        <p:spPr/>
+        <p:txBody>
+          <a:bodyPr/>
+          <a:lstStyle/>
+          <a:p>
+            <a:r>
+              <a:rPr lang="en-US" dirty="0"/>
+              <a:t>Database script process</a:t>
+            </a:r>
+          </a:p>
+        </p:txBody>
+      </p:sp>
+      <p:graphicFrame>
+        <p:nvGraphicFramePr>
+          <p:cNvPr id="3" name="Diagram 2">
+            <a:extLst>
+              <a:ext uri="{FF2B5EF4-FFF2-40B4-BE49-F238E27FC236}">
+                <a16:creationId xmlns:a16="http://schemas.microsoft.com/office/drawing/2014/main" id="{66404DAE-54DB-480A-9268-EA9CD3E22059}"/>
+              </a:ext>
+            </a:extLst>
+          </p:cNvPr>
+          <p:cNvGraphicFramePr/>
+          <p:nvPr>
+            <p:extLst>
+              <p:ext uri="{D42A27DB-BD31-4B8C-83A1-F6EECF244321}">
+                <p14:modId xmlns:p14="http://schemas.microsoft.com/office/powerpoint/2010/main" val="959414610"/>
+              </p:ext>
+            </p:extLst>
+          </p:nvPr>
+        </p:nvGraphicFramePr>
+        <p:xfrm>
+          <a:off x="2401510" y="302416"/>
+          <a:ext cx="7378330" cy="4553670"/>
+        </p:xfrm>
+        <a:graphic>
+          <a:graphicData uri="http://schemas.openxmlformats.org/drawingml/2006/diagram">
+            <dgm:relIds xmlns:dgm="http://schemas.openxmlformats.org/drawingml/2006/diagram" xmlns:r="http://schemas.openxmlformats.org/officeDocument/2006/relationships" r:dm="rId2" r:lo="rId3" r:qs="rId4" r:cs="rId5"/>
+          </a:graphicData>
+        </a:graphic>
+      </p:graphicFrame>
+      <p:sp>
+        <p:nvSpPr>
+          <p:cNvPr id="4" name="TextBox 3">
+            <a:extLst>
+              <a:ext uri="{FF2B5EF4-FFF2-40B4-BE49-F238E27FC236}">
+                <a16:creationId xmlns:a16="http://schemas.microsoft.com/office/drawing/2014/main" id="{75840680-4465-4620-9DF6-C2526836A0F6}"/>
+              </a:ext>
+            </a:extLst>
+          </p:cNvPr>
+          <p:cNvSpPr txBox="1"/>
+          <p:nvPr/>
+        </p:nvSpPr>
+        <p:spPr>
+          <a:xfrm>
+            <a:off x="1518675" y="3349101"/>
+            <a:ext cx="9144000" cy="2862322"/>
+          </a:xfrm>
+          <a:prstGeom prst="rect">
+            <a:avLst/>
+          </a:prstGeom>
+          <a:noFill/>
+        </p:spPr>
+        <p:txBody>
+          <a:bodyPr wrap="square" rtlCol="0">
+            <a:spAutoFit/>
+          </a:bodyPr>
+          <a:lstStyle/>
+          <a:p>
+            <a:pPr marL="457200" indent="-457200">
+              <a:buAutoNum type="arabicPeriod"/>
+            </a:pPr>
+            <a:r>
+              <a:rPr lang="en-US" sz="2000" dirty="0"/>
+              <a:t>Make a column on the Excel file to concatenate columns in the format of our table inserts and fill that column.</a:t>
+            </a:r>
+          </a:p>
+          <a:p>
+            <a:pPr marL="457200" indent="-457200">
+              <a:buAutoNum type="arabicPeriod"/>
+            </a:pPr>
+            <a:r>
+              <a:rPr lang="en-US" sz="2000" dirty="0"/>
+              <a:t>Use a Python script to parse the inserts that are taken from the Excel column and put it into a list.</a:t>
+            </a:r>
+          </a:p>
+          <a:p>
+            <a:pPr marL="457200" indent="-457200">
+              <a:buAutoNum type="arabicPeriod"/>
+            </a:pPr>
+            <a:r>
+              <a:rPr lang="en-US" sz="2000" dirty="0"/>
+              <a:t>Use the Python script to replace data cells with IDs based off look-up tables that are already created and populated.</a:t>
+            </a:r>
+          </a:p>
+          <a:p>
+            <a:pPr marL="457200" indent="-457200">
+              <a:buAutoNum type="arabicPeriod"/>
+            </a:pPr>
+            <a:r>
+              <a:rPr lang="en-US" sz="2000" dirty="0"/>
+              <a:t>Use the structure created by this combined table to start creating or fixing tables in SSMS.</a:t>
+            </a:r>
+          </a:p>
+          <a:p>
+            <a:pPr marL="457200" indent="-457200">
+              <a:buAutoNum type="arabicPeriod"/>
+            </a:pPr>
+            <a:r>
+              <a:rPr lang="en-US" sz="2000" dirty="0"/>
+              <a:t>Take inserts from modified SSMS tables and replace your initial inserts.</a:t>
+            </a:r>
+          </a:p>
+        </p:txBody>
+      </p:sp>
+    </p:spTree>
+    <p:extLst>
+      <p:ext uri="{BB962C8B-B14F-4D97-AF65-F5344CB8AC3E}">
+        <p14:creationId xmlns:p14="http://schemas.microsoft.com/office/powerpoint/2010/main" val="1227497966"/>
+      </p:ext>
+    </p:extLst>
+  </p:cSld>
+  <p:clrMapOvr>
+    <a:masterClrMapping/>
+  </p:clrMapOvr>
+</p:sld>
+</file>
+
 <file path=ppt/theme/theme1.xml><?xml version="1.0" encoding="utf-8"?>
 <a:theme xmlns:a="http://schemas.openxmlformats.org/drawingml/2006/main" name="Damask">
   <a:themeElements>
@@ -5867,6 +8847,23 @@
 </file>
 
 <file path=customXml/item1.xml><?xml version="1.0" encoding="utf-8"?>
+<p:properties xmlns:p="http://schemas.microsoft.com/office/2006/metadata/properties" xmlns:xsi="http://www.w3.org/2001/XMLSchema-instance" xmlns:pc="http://schemas.microsoft.com/office/infopath/2007/PartnerControls">
+  <documentManagement>
+    <_activity xmlns="91772a91-5c90-4de1-8a0a-d068e7511df0" xsi:nil="true"/>
+  </documentManagement>
+</p:properties>
+</file>
+
+<file path=customXml/item2.xml><?xml version="1.0" encoding="utf-8"?>
+<?mso-contentType ?>
+<FormTemplates xmlns="http://schemas.microsoft.com/sharepoint/v3/contenttype/forms">
+  <Display>DocumentLibraryForm</Display>
+  <Edit>DocumentLibraryForm</Edit>
+  <New>DocumentLibraryForm</New>
+</FormTemplates>
+</file>
+
+<file path=customXml/item3.xml><?xml version="1.0" encoding="utf-8"?>
 <ct:contentTypeSchema xmlns:ct="http://schemas.microsoft.com/office/2006/metadata/contentType" xmlns:ma="http://schemas.microsoft.com/office/2006/metadata/properties/metaAttributes" ct:_="" ma:_="" ma:contentTypeName="Document" ma:contentTypeID="0x01010051DE4EC262301945BC1A0638B54FDD47" ma:contentTypeVersion="9" ma:contentTypeDescription="Create a new document." ma:contentTypeScope="" ma:versionID="d781c0cb96618e08976331334df1a302">
   <xsd:schema xmlns:xsd="http://www.w3.org/2001/XMLSchema" xmlns:xs="http://www.w3.org/2001/XMLSchema" xmlns:p="http://schemas.microsoft.com/office/2006/metadata/properties" xmlns:ns3="91772a91-5c90-4de1-8a0a-d068e7511df0" xmlns:ns4="7fefc207-8b93-4960-97b9-dc454dffb9cb" targetNamespace="http://schemas.microsoft.com/office/2006/metadata/properties" ma:root="true" ma:fieldsID="5234541a54bb110cfd93ab183e628fab" ns3:_="" ns4:_="">
     <xsd:import namespace="91772a91-5c90-4de1-8a0a-d068e7511df0"/>
@@ -6061,24 +9058,32 @@
 </ct:contentTypeSchema>
 </file>
 
-<file path=customXml/item2.xml><?xml version="1.0" encoding="utf-8"?>
-<?mso-contentType ?>
-<FormTemplates xmlns="http://schemas.microsoft.com/sharepoint/v3/contenttype/forms">
-  <Display>DocumentLibraryForm</Display>
-  <Edit>DocumentLibraryForm</Edit>
-  <New>DocumentLibraryForm</New>
-</FormTemplates>
+<file path=customXml/itemProps1.xml><?xml version="1.0" encoding="utf-8"?>
+<ds:datastoreItem xmlns:ds="http://schemas.openxmlformats.org/officeDocument/2006/customXml" ds:itemID="{A335286B-8A11-4564-903A-C29A3ED849BB}">
+  <ds:schemaRefs>
+    <ds:schemaRef ds:uri="http://schemas.microsoft.com/office/2006/documentManagement/types"/>
+    <ds:schemaRef ds:uri="http://schemas.microsoft.com/office/2006/metadata/properties"/>
+    <ds:schemaRef ds:uri="http://purl.org/dc/terms/"/>
+    <ds:schemaRef ds:uri="http://www.w3.org/XML/1998/namespace"/>
+    <ds:schemaRef ds:uri="7fefc207-8b93-4960-97b9-dc454dffb9cb"/>
+    <ds:schemaRef ds:uri="http://schemas.microsoft.com/office/infopath/2007/PartnerControls"/>
+    <ds:schemaRef ds:uri="http://schemas.openxmlformats.org/package/2006/metadata/core-properties"/>
+    <ds:schemaRef ds:uri="http://purl.org/dc/dcmitype/"/>
+    <ds:schemaRef ds:uri="http://purl.org/dc/elements/1.1/"/>
+    <ds:schemaRef ds:uri="91772a91-5c90-4de1-8a0a-d068e7511df0"/>
+  </ds:schemaRefs>
+</ds:datastoreItem>
 </file>
 
-<file path=customXml/item3.xml><?xml version="1.0" encoding="utf-8"?>
-<p:properties xmlns:p="http://schemas.microsoft.com/office/2006/metadata/properties" xmlns:xsi="http://www.w3.org/2001/XMLSchema-instance" xmlns:pc="http://schemas.microsoft.com/office/infopath/2007/PartnerControls">
-  <documentManagement>
-    <_activity xmlns="91772a91-5c90-4de1-8a0a-d068e7511df0" xsi:nil="true"/>
-  </documentManagement>
-</p:properties>
+<file path=customXml/itemProps2.xml><?xml version="1.0" encoding="utf-8"?>
+<ds:datastoreItem xmlns:ds="http://schemas.openxmlformats.org/officeDocument/2006/customXml" ds:itemID="{0E8F4389-F946-43C0-AE4D-0B0A72C6C3F7}">
+  <ds:schemaRefs>
+    <ds:schemaRef ds:uri="http://schemas.microsoft.com/sharepoint/v3/contenttype/forms"/>
+  </ds:schemaRefs>
+</ds:datastoreItem>
 </file>
 
-<file path=customXml/itemProps1.xml><?xml version="1.0" encoding="utf-8"?>
+<file path=customXml/itemProps3.xml><?xml version="1.0" encoding="utf-8"?>
 <ds:datastoreItem xmlns:ds="http://schemas.openxmlformats.org/officeDocument/2006/customXml" ds:itemID="{3AE99D97-2B5B-49E0-BA07-E2F5E9F91384}">
   <ds:schemaRefs>
     <ds:schemaRef ds:uri="http://schemas.microsoft.com/office/2006/metadata/contentType"/>
@@ -6095,29 +9100,4 @@
     <ds:schemaRef ds:uri="http://schemas.microsoft.com/internal/obd"/>
   </ds:schemaRefs>
 </ds:datastoreItem>
-</file>
-
-<file path=customXml/itemProps2.xml><?xml version="1.0" encoding="utf-8"?>
-<ds:datastoreItem xmlns:ds="http://schemas.openxmlformats.org/officeDocument/2006/customXml" ds:itemID="{0E8F4389-F946-43C0-AE4D-0B0A72C6C3F7}">
-  <ds:schemaRefs>
-    <ds:schemaRef ds:uri="http://schemas.microsoft.com/sharepoint/v3/contenttype/forms"/>
-  </ds:schemaRefs>
-</ds:datastoreItem>
-</file>
-
-<file path=customXml/itemProps3.xml><?xml version="1.0" encoding="utf-8"?>
-<ds:datastoreItem xmlns:ds="http://schemas.openxmlformats.org/officeDocument/2006/customXml" ds:itemID="{A335286B-8A11-4564-903A-C29A3ED849BB}">
-  <ds:schemaRefs>
-    <ds:schemaRef ds:uri="http://schemas.microsoft.com/office/2006/documentManagement/types"/>
-    <ds:schemaRef ds:uri="http://schemas.microsoft.com/office/2006/metadata/properties"/>
-    <ds:schemaRef ds:uri="http://purl.org/dc/terms/"/>
-    <ds:schemaRef ds:uri="http://www.w3.org/XML/1998/namespace"/>
-    <ds:schemaRef ds:uri="7fefc207-8b93-4960-97b9-dc454dffb9cb"/>
-    <ds:schemaRef ds:uri="http://schemas.microsoft.com/office/infopath/2007/PartnerControls"/>
-    <ds:schemaRef ds:uri="http://schemas.openxmlformats.org/package/2006/metadata/core-properties"/>
-    <ds:schemaRef ds:uri="http://purl.org/dc/dcmitype/"/>
-    <ds:schemaRef ds:uri="http://purl.org/dc/elements/1.1/"/>
-    <ds:schemaRef ds:uri="91772a91-5c90-4de1-8a0a-d068e7511df0"/>
-  </ds:schemaRefs>
-</ds:datastoreItem>
 </file>
</xml_diff>

<commit_message>
Presentation ERD size and crop fix
</commit_message>
<xml_diff>
--- a/B320_Project_Presentation.pptx
+++ b/B320_Project_Presentation.pptx
@@ -8371,7 +8371,7 @@
         </p:nvSpPr>
         <p:spPr>
           <a:xfrm>
-            <a:off x="366944" y="591845"/>
+            <a:off x="-245615" y="982463"/>
             <a:ext cx="4439440" cy="1326321"/>
           </a:xfrm>
         </p:spPr>
@@ -8404,16 +8404,15 @@
             <p:ph idx="1"/>
           </p:nvPr>
         </p:nvPicPr>
-        <p:blipFill>
+        <p:blipFill rotWithShape="1">
           <a:blip r:embed="rId2"/>
-          <a:stretch>
-            <a:fillRect/>
-          </a:stretch>
+          <a:srcRect l="2023" t="4919" r="1817" b="2006"/>
+          <a:stretch/>
         </p:blipFill>
         <p:spPr>
           <a:xfrm>
-            <a:off x="4996809" y="526186"/>
-            <a:ext cx="6757226" cy="5805627"/>
+            <a:off x="4080468" y="171033"/>
+            <a:ext cx="7835418" cy="6515934"/>
           </a:xfrm>
         </p:spPr>
       </p:pic>
@@ -8847,23 +8846,6 @@
 </file>
 
 <file path=customXml/item1.xml><?xml version="1.0" encoding="utf-8"?>
-<p:properties xmlns:p="http://schemas.microsoft.com/office/2006/metadata/properties" xmlns:xsi="http://www.w3.org/2001/XMLSchema-instance" xmlns:pc="http://schemas.microsoft.com/office/infopath/2007/PartnerControls">
-  <documentManagement>
-    <_activity xmlns="91772a91-5c90-4de1-8a0a-d068e7511df0" xsi:nil="true"/>
-  </documentManagement>
-</p:properties>
-</file>
-
-<file path=customXml/item2.xml><?xml version="1.0" encoding="utf-8"?>
-<?mso-contentType ?>
-<FormTemplates xmlns="http://schemas.microsoft.com/sharepoint/v3/contenttype/forms">
-  <Display>DocumentLibraryForm</Display>
-  <Edit>DocumentLibraryForm</Edit>
-  <New>DocumentLibraryForm</New>
-</FormTemplates>
-</file>
-
-<file path=customXml/item3.xml><?xml version="1.0" encoding="utf-8"?>
 <ct:contentTypeSchema xmlns:ct="http://schemas.microsoft.com/office/2006/metadata/contentType" xmlns:ma="http://schemas.microsoft.com/office/2006/metadata/properties/metaAttributes" ct:_="" ma:_="" ma:contentTypeName="Document" ma:contentTypeID="0x01010051DE4EC262301945BC1A0638B54FDD47" ma:contentTypeVersion="9" ma:contentTypeDescription="Create a new document." ma:contentTypeScope="" ma:versionID="d781c0cb96618e08976331334df1a302">
   <xsd:schema xmlns:xsd="http://www.w3.org/2001/XMLSchema" xmlns:xs="http://www.w3.org/2001/XMLSchema" xmlns:p="http://schemas.microsoft.com/office/2006/metadata/properties" xmlns:ns3="91772a91-5c90-4de1-8a0a-d068e7511df0" xmlns:ns4="7fefc207-8b93-4960-97b9-dc454dffb9cb" targetNamespace="http://schemas.microsoft.com/office/2006/metadata/properties" ma:root="true" ma:fieldsID="5234541a54bb110cfd93ab183e628fab" ns3:_="" ns4:_="">
     <xsd:import namespace="91772a91-5c90-4de1-8a0a-d068e7511df0"/>
@@ -9058,32 +9040,24 @@
 </ct:contentTypeSchema>
 </file>
 
-<file path=customXml/itemProps1.xml><?xml version="1.0" encoding="utf-8"?>
-<ds:datastoreItem xmlns:ds="http://schemas.openxmlformats.org/officeDocument/2006/customXml" ds:itemID="{A335286B-8A11-4564-903A-C29A3ED849BB}">
-  <ds:schemaRefs>
-    <ds:schemaRef ds:uri="http://schemas.microsoft.com/office/2006/documentManagement/types"/>
-    <ds:schemaRef ds:uri="http://schemas.microsoft.com/office/2006/metadata/properties"/>
-    <ds:schemaRef ds:uri="http://purl.org/dc/terms/"/>
-    <ds:schemaRef ds:uri="http://www.w3.org/XML/1998/namespace"/>
-    <ds:schemaRef ds:uri="7fefc207-8b93-4960-97b9-dc454dffb9cb"/>
-    <ds:schemaRef ds:uri="http://schemas.microsoft.com/office/infopath/2007/PartnerControls"/>
-    <ds:schemaRef ds:uri="http://schemas.openxmlformats.org/package/2006/metadata/core-properties"/>
-    <ds:schemaRef ds:uri="http://purl.org/dc/dcmitype/"/>
-    <ds:schemaRef ds:uri="http://purl.org/dc/elements/1.1/"/>
-    <ds:schemaRef ds:uri="91772a91-5c90-4de1-8a0a-d068e7511df0"/>
-  </ds:schemaRefs>
-</ds:datastoreItem>
+<file path=customXml/item2.xml><?xml version="1.0" encoding="utf-8"?>
+<?mso-contentType ?>
+<FormTemplates xmlns="http://schemas.microsoft.com/sharepoint/v3/contenttype/forms">
+  <Display>DocumentLibraryForm</Display>
+  <Edit>DocumentLibraryForm</Edit>
+  <New>DocumentLibraryForm</New>
+</FormTemplates>
 </file>
 
-<file path=customXml/itemProps2.xml><?xml version="1.0" encoding="utf-8"?>
-<ds:datastoreItem xmlns:ds="http://schemas.openxmlformats.org/officeDocument/2006/customXml" ds:itemID="{0E8F4389-F946-43C0-AE4D-0B0A72C6C3F7}">
-  <ds:schemaRefs>
-    <ds:schemaRef ds:uri="http://schemas.microsoft.com/sharepoint/v3/contenttype/forms"/>
-  </ds:schemaRefs>
-</ds:datastoreItem>
+<file path=customXml/item3.xml><?xml version="1.0" encoding="utf-8"?>
+<p:properties xmlns:p="http://schemas.microsoft.com/office/2006/metadata/properties" xmlns:xsi="http://www.w3.org/2001/XMLSchema-instance" xmlns:pc="http://schemas.microsoft.com/office/infopath/2007/PartnerControls">
+  <documentManagement>
+    <_activity xmlns="91772a91-5c90-4de1-8a0a-d068e7511df0" xsi:nil="true"/>
+  </documentManagement>
+</p:properties>
 </file>
 
-<file path=customXml/itemProps3.xml><?xml version="1.0" encoding="utf-8"?>
+<file path=customXml/itemProps1.xml><?xml version="1.0" encoding="utf-8"?>
 <ds:datastoreItem xmlns:ds="http://schemas.openxmlformats.org/officeDocument/2006/customXml" ds:itemID="{3AE99D97-2B5B-49E0-BA07-E2F5E9F91384}">
   <ds:schemaRefs>
     <ds:schemaRef ds:uri="http://schemas.microsoft.com/office/2006/metadata/contentType"/>
@@ -9100,4 +9074,29 @@
     <ds:schemaRef ds:uri="http://schemas.microsoft.com/internal/obd"/>
   </ds:schemaRefs>
 </ds:datastoreItem>
+</file>
+
+<file path=customXml/itemProps2.xml><?xml version="1.0" encoding="utf-8"?>
+<ds:datastoreItem xmlns:ds="http://schemas.openxmlformats.org/officeDocument/2006/customXml" ds:itemID="{0E8F4389-F946-43C0-AE4D-0B0A72C6C3F7}">
+  <ds:schemaRefs>
+    <ds:schemaRef ds:uri="http://schemas.microsoft.com/sharepoint/v3/contenttype/forms"/>
+  </ds:schemaRefs>
+</ds:datastoreItem>
+</file>
+
+<file path=customXml/itemProps3.xml><?xml version="1.0" encoding="utf-8"?>
+<ds:datastoreItem xmlns:ds="http://schemas.openxmlformats.org/officeDocument/2006/customXml" ds:itemID="{A335286B-8A11-4564-903A-C29A3ED849BB}">
+  <ds:schemaRefs>
+    <ds:schemaRef ds:uri="http://schemas.microsoft.com/office/2006/documentManagement/types"/>
+    <ds:schemaRef ds:uri="http://schemas.microsoft.com/office/2006/metadata/properties"/>
+    <ds:schemaRef ds:uri="http://purl.org/dc/terms/"/>
+    <ds:schemaRef ds:uri="http://www.w3.org/XML/1998/namespace"/>
+    <ds:schemaRef ds:uri="7fefc207-8b93-4960-97b9-dc454dffb9cb"/>
+    <ds:schemaRef ds:uri="http://schemas.microsoft.com/office/infopath/2007/PartnerControls"/>
+    <ds:schemaRef ds:uri="http://schemas.openxmlformats.org/package/2006/metadata/core-properties"/>
+    <ds:schemaRef ds:uri="http://purl.org/dc/dcmitype/"/>
+    <ds:schemaRef ds:uri="http://purl.org/dc/elements/1.1/"/>
+    <ds:schemaRef ds:uri="91772a91-5c90-4de1-8a0a-d068e7511df0"/>
+  </ds:schemaRefs>
+</ds:datastoreItem>
 </file>
</xml_diff>